<commit_message>
updated documentation and slides
</commit_message>
<xml_diff>
--- a/doc/slides/day2/session1/CLIScripting.pptx
+++ b/doc/slides/day2/session1/CLIScripting.pptx
@@ -193,7 +193,7 @@
             <a:fld id="{BEBD7BB8-CB0F-3147-8597-AF5DC6013C28}" type="datetimeFigureOut">
               <a:rPr lang="en-US" smtClean="0"/>
               <a:pPr/>
-              <a:t>8/29/12</a:t>
+              <a:t>8/31/12</a:t>
             </a:fld>
             <a:endParaRPr lang="en-US"/>
           </a:p>
@@ -507,29 +507,29 @@
           <a:p>
             <a:r>
               <a:rPr lang="en-US" dirty="0" smtClean="0"/>
-              <a:t>Introducing bash scripting. Exercise: iterate over a set of files in a directory to perform an </a:t>
-            </a:r>
-            <a:r>
-              <a:rPr lang="en-US" dirty="0" smtClean="0"/>
-              <a:t>operation,</a:t>
+              <a:t>Introducing bash scripting. Exercise: iterate over a set of files in a directory to perform an operation,</a:t>
             </a:r>
             <a:r>
               <a:rPr lang="en-US" baseline="0" dirty="0" smtClean="0"/>
-              <a:t> e.g. </a:t>
+              <a:t> e.g.</a:t>
+            </a:r>
+            <a:r>
+              <a:rPr lang="en-US" baseline="0" dirty="0" smtClean="0"/>
+              <a:t> </a:t>
             </a:r>
             <a:r>
               <a:rPr lang="en-US" baseline="0" dirty="0" err="1" smtClean="0"/>
-              <a:t>SAMtools</a:t>
+              <a:t>bwa</a:t>
+            </a:r>
+            <a:r>
+              <a:rPr lang="en-US" baseline="0" smtClean="0"/>
+              <a:t> on </a:t>
             </a:r>
             <a:r>
               <a:rPr lang="en-US" baseline="0" dirty="0" smtClean="0"/>
-              <a:t> on </a:t>
-            </a:r>
-            <a:r>
-              <a:rPr lang="en-US" baseline="0" smtClean="0"/>
               <a:t>many files.</a:t>
             </a:r>
-            <a:endParaRPr lang="en-US"/>
+            <a:endParaRPr lang="en-US" dirty="0"/>
           </a:p>
         </p:txBody>
       </p:sp>
@@ -747,7 +747,7 @@
             <a:fld id="{49072BD6-7320-8A4C-B5BF-960FC4D05047}" type="datetimeFigureOut">
               <a:rPr lang="en-US" smtClean="0"/>
               <a:pPr/>
-              <a:t>8/29/12</a:t>
+              <a:t>8/31/12</a:t>
             </a:fld>
             <a:endParaRPr lang="en-US"/>
           </a:p>
@@ -914,7 +914,7 @@
             <a:fld id="{49072BD6-7320-8A4C-B5BF-960FC4D05047}" type="datetimeFigureOut">
               <a:rPr lang="en-US" smtClean="0"/>
               <a:pPr/>
-              <a:t>8/29/12</a:t>
+              <a:t>8/31/12</a:t>
             </a:fld>
             <a:endParaRPr lang="en-US"/>
           </a:p>
@@ -1091,7 +1091,7 @@
             <a:fld id="{49072BD6-7320-8A4C-B5BF-960FC4D05047}" type="datetimeFigureOut">
               <a:rPr lang="en-US" smtClean="0"/>
               <a:pPr/>
-              <a:t>8/29/12</a:t>
+              <a:t>8/31/12</a:t>
             </a:fld>
             <a:endParaRPr lang="en-US"/>
           </a:p>
@@ -1258,7 +1258,7 @@
             <a:fld id="{49072BD6-7320-8A4C-B5BF-960FC4D05047}" type="datetimeFigureOut">
               <a:rPr lang="en-US" smtClean="0"/>
               <a:pPr/>
-              <a:t>8/29/12</a:t>
+              <a:t>8/31/12</a:t>
             </a:fld>
             <a:endParaRPr lang="en-US"/>
           </a:p>
@@ -1501,7 +1501,7 @@
             <a:fld id="{49072BD6-7320-8A4C-B5BF-960FC4D05047}" type="datetimeFigureOut">
               <a:rPr lang="en-US" smtClean="0"/>
               <a:pPr/>
-              <a:t>8/29/12</a:t>
+              <a:t>8/31/12</a:t>
             </a:fld>
             <a:endParaRPr lang="en-US"/>
           </a:p>
@@ -1786,7 +1786,7 @@
             <a:fld id="{49072BD6-7320-8A4C-B5BF-960FC4D05047}" type="datetimeFigureOut">
               <a:rPr lang="en-US" smtClean="0"/>
               <a:pPr/>
-              <a:t>8/29/12</a:t>
+              <a:t>8/31/12</a:t>
             </a:fld>
             <a:endParaRPr lang="en-US"/>
           </a:p>
@@ -2205,7 +2205,7 @@
             <a:fld id="{49072BD6-7320-8A4C-B5BF-960FC4D05047}" type="datetimeFigureOut">
               <a:rPr lang="en-US" smtClean="0"/>
               <a:pPr/>
-              <a:t>8/29/12</a:t>
+              <a:t>8/31/12</a:t>
             </a:fld>
             <a:endParaRPr lang="en-US"/>
           </a:p>
@@ -2320,7 +2320,7 @@
             <a:fld id="{49072BD6-7320-8A4C-B5BF-960FC4D05047}" type="datetimeFigureOut">
               <a:rPr lang="en-US" smtClean="0"/>
               <a:pPr/>
-              <a:t>8/29/12</a:t>
+              <a:t>8/31/12</a:t>
             </a:fld>
             <a:endParaRPr lang="en-US"/>
           </a:p>
@@ -2412,7 +2412,7 @@
             <a:fld id="{49072BD6-7320-8A4C-B5BF-960FC4D05047}" type="datetimeFigureOut">
               <a:rPr lang="en-US" smtClean="0"/>
               <a:pPr/>
-              <a:t>8/29/12</a:t>
+              <a:t>8/31/12</a:t>
             </a:fld>
             <a:endParaRPr lang="en-US"/>
           </a:p>
@@ -2686,7 +2686,7 @@
             <a:fld id="{49072BD6-7320-8A4C-B5BF-960FC4D05047}" type="datetimeFigureOut">
               <a:rPr lang="en-US" smtClean="0"/>
               <a:pPr/>
-              <a:t>8/29/12</a:t>
+              <a:t>8/31/12</a:t>
             </a:fld>
             <a:endParaRPr lang="en-US"/>
           </a:p>
@@ -2936,7 +2936,7 @@
             <a:fld id="{49072BD6-7320-8A4C-B5BF-960FC4D05047}" type="datetimeFigureOut">
               <a:rPr lang="en-US" smtClean="0"/>
               <a:pPr/>
-              <a:t>8/29/12</a:t>
+              <a:t>8/31/12</a:t>
             </a:fld>
             <a:endParaRPr lang="en-US"/>
           </a:p>
@@ -3146,7 +3146,7 @@
             <a:fld id="{49072BD6-7320-8A4C-B5BF-960FC4D05047}" type="datetimeFigureOut">
               <a:rPr lang="en-US" smtClean="0"/>
               <a:pPr/>
-              <a:t>8/29/12</a:t>
+              <a:t>8/31/12</a:t>
             </a:fld>
             <a:endParaRPr lang="en-US"/>
           </a:p>

</xml_diff>

<commit_message>
nearly complete, exercise needs to be fleshed out
</commit_message>
<xml_diff>
--- a/doc/slides/day2/session1/CLIScripting.pptx
+++ b/doc/slides/day2/session1/CLIScripting.pptx
@@ -5,22 +5,25 @@
     <p:sldMasterId id="2147483648" r:id="rId1"/>
   </p:sldMasterIdLst>
   <p:notesMasterIdLst>
-    <p:notesMasterId r:id="rId15"/>
+    <p:notesMasterId r:id="rId18"/>
   </p:notesMasterIdLst>
   <p:sldIdLst>
     <p:sldId id="256" r:id="rId2"/>
-    <p:sldId id="257" r:id="rId3"/>
+    <p:sldId id="260" r:id="rId3"/>
     <p:sldId id="258" r:id="rId4"/>
-    <p:sldId id="260" r:id="rId5"/>
-    <p:sldId id="259" r:id="rId6"/>
-    <p:sldId id="268" r:id="rId7"/>
-    <p:sldId id="267" r:id="rId8"/>
-    <p:sldId id="266" r:id="rId9"/>
-    <p:sldId id="269" r:id="rId10"/>
-    <p:sldId id="265" r:id="rId11"/>
-    <p:sldId id="262" r:id="rId12"/>
-    <p:sldId id="261" r:id="rId13"/>
-    <p:sldId id="264" r:id="rId14"/>
+    <p:sldId id="257" r:id="rId5"/>
+    <p:sldId id="271" r:id="rId6"/>
+    <p:sldId id="261" r:id="rId7"/>
+    <p:sldId id="259" r:id="rId8"/>
+    <p:sldId id="270" r:id="rId9"/>
+    <p:sldId id="272" r:id="rId10"/>
+    <p:sldId id="262" r:id="rId11"/>
+    <p:sldId id="267" r:id="rId12"/>
+    <p:sldId id="265" r:id="rId13"/>
+    <p:sldId id="273" r:id="rId14"/>
+    <p:sldId id="266" r:id="rId15"/>
+    <p:sldId id="269" r:id="rId16"/>
+    <p:sldId id="264" r:id="rId17"/>
   </p:sldIdLst>
   <p:sldSz cx="9144000" cy="6858000" type="screen4x3"/>
   <p:notesSz cx="6858000" cy="9144000"/>
@@ -205,7 +208,7 @@
             <a:fld id="{BEBD7BB8-CB0F-3147-8597-AF5DC6013C28}" type="datetimeFigureOut">
               <a:rPr lang="en-US" smtClean="0"/>
               <a:pPr/>
-              <a:t>9/3/12</a:t>
+              <a:t>9/4/12</a:t>
             </a:fld>
             <a:endParaRPr lang="en-US"/>
           </a:p>
@@ -621,13 +624,17 @@
           <a:p>
             <a:r>
               <a:rPr lang="en-US" dirty="0" smtClean="0"/>
-              <a:t>For this exercise we need a directory of similar files that all need to </a:t>
-            </a:r>
-            <a:r>
-              <a:rPr lang="en-US" smtClean="0"/>
-              <a:t>be processed</a:t>
-            </a:r>
-            <a:endParaRPr lang="en-US"/>
+              <a:t>Is there a command line program that tests validity</a:t>
+            </a:r>
+            <a:r>
+              <a:rPr lang="en-US" baseline="0" dirty="0" smtClean="0"/>
+              <a:t> of </a:t>
+            </a:r>
+            <a:r>
+              <a:rPr lang="en-US" baseline="0" smtClean="0"/>
+              <a:t>FASTQ files?</a:t>
+            </a:r>
+            <a:endParaRPr lang="en-US" dirty="0"/>
           </a:p>
         </p:txBody>
       </p:sp>
@@ -649,7 +656,7 @@
             <a:fld id="{4D83696D-1FDB-3747-BF38-2B83E9AFCFF7}" type="slidenum">
               <a:rPr lang="en-US" smtClean="0"/>
               <a:pPr/>
-              <a:t>13</a:t>
+              <a:t>16</a:t>
             </a:fld>
             <a:endParaRPr lang="en-US"/>
           </a:p>
@@ -845,7 +852,7 @@
             <a:fld id="{49072BD6-7320-8A4C-B5BF-960FC4D05047}" type="datetimeFigureOut">
               <a:rPr lang="en-US" smtClean="0"/>
               <a:pPr/>
-              <a:t>9/3/12</a:t>
+              <a:t>9/4/12</a:t>
             </a:fld>
             <a:endParaRPr lang="en-US"/>
           </a:p>
@@ -1012,7 +1019,7 @@
             <a:fld id="{49072BD6-7320-8A4C-B5BF-960FC4D05047}" type="datetimeFigureOut">
               <a:rPr lang="en-US" smtClean="0"/>
               <a:pPr/>
-              <a:t>9/3/12</a:t>
+              <a:t>9/4/12</a:t>
             </a:fld>
             <a:endParaRPr lang="en-US"/>
           </a:p>
@@ -1189,7 +1196,7 @@
             <a:fld id="{49072BD6-7320-8A4C-B5BF-960FC4D05047}" type="datetimeFigureOut">
               <a:rPr lang="en-US" smtClean="0"/>
               <a:pPr/>
-              <a:t>9/3/12</a:t>
+              <a:t>9/4/12</a:t>
             </a:fld>
             <a:endParaRPr lang="en-US"/>
           </a:p>
@@ -1356,7 +1363,7 @@
             <a:fld id="{49072BD6-7320-8A4C-B5BF-960FC4D05047}" type="datetimeFigureOut">
               <a:rPr lang="en-US" smtClean="0"/>
               <a:pPr/>
-              <a:t>9/3/12</a:t>
+              <a:t>9/4/12</a:t>
             </a:fld>
             <a:endParaRPr lang="en-US"/>
           </a:p>
@@ -1599,7 +1606,7 @@
             <a:fld id="{49072BD6-7320-8A4C-B5BF-960FC4D05047}" type="datetimeFigureOut">
               <a:rPr lang="en-US" smtClean="0"/>
               <a:pPr/>
-              <a:t>9/3/12</a:t>
+              <a:t>9/4/12</a:t>
             </a:fld>
             <a:endParaRPr lang="en-US"/>
           </a:p>
@@ -1884,7 +1891,7 @@
             <a:fld id="{49072BD6-7320-8A4C-B5BF-960FC4D05047}" type="datetimeFigureOut">
               <a:rPr lang="en-US" smtClean="0"/>
               <a:pPr/>
-              <a:t>9/3/12</a:t>
+              <a:t>9/4/12</a:t>
             </a:fld>
             <a:endParaRPr lang="en-US"/>
           </a:p>
@@ -2303,7 +2310,7 @@
             <a:fld id="{49072BD6-7320-8A4C-B5BF-960FC4D05047}" type="datetimeFigureOut">
               <a:rPr lang="en-US" smtClean="0"/>
               <a:pPr/>
-              <a:t>9/3/12</a:t>
+              <a:t>9/4/12</a:t>
             </a:fld>
             <a:endParaRPr lang="en-US"/>
           </a:p>
@@ -2418,7 +2425,7 @@
             <a:fld id="{49072BD6-7320-8A4C-B5BF-960FC4D05047}" type="datetimeFigureOut">
               <a:rPr lang="en-US" smtClean="0"/>
               <a:pPr/>
-              <a:t>9/3/12</a:t>
+              <a:t>9/4/12</a:t>
             </a:fld>
             <a:endParaRPr lang="en-US"/>
           </a:p>
@@ -2510,7 +2517,7 @@
             <a:fld id="{49072BD6-7320-8A4C-B5BF-960FC4D05047}" type="datetimeFigureOut">
               <a:rPr lang="en-US" smtClean="0"/>
               <a:pPr/>
-              <a:t>9/3/12</a:t>
+              <a:t>9/4/12</a:t>
             </a:fld>
             <a:endParaRPr lang="en-US"/>
           </a:p>
@@ -2784,7 +2791,7 @@
             <a:fld id="{49072BD6-7320-8A4C-B5BF-960FC4D05047}" type="datetimeFigureOut">
               <a:rPr lang="en-US" smtClean="0"/>
               <a:pPr/>
-              <a:t>9/3/12</a:t>
+              <a:t>9/4/12</a:t>
             </a:fld>
             <a:endParaRPr lang="en-US"/>
           </a:p>
@@ -3034,7 +3041,7 @@
             <a:fld id="{49072BD6-7320-8A4C-B5BF-960FC4D05047}" type="datetimeFigureOut">
               <a:rPr lang="en-US" smtClean="0"/>
               <a:pPr/>
-              <a:t>9/3/12</a:t>
+              <a:t>9/4/12</a:t>
             </a:fld>
             <a:endParaRPr lang="en-US"/>
           </a:p>
@@ -3244,7 +3251,7 @@
             <a:fld id="{49072BD6-7320-8A4C-B5BF-960FC4D05047}" type="datetimeFigureOut">
               <a:rPr lang="en-US" smtClean="0"/>
               <a:pPr/>
-              <a:t>9/3/12</a:t>
+              <a:t>9/4/12</a:t>
             </a:fld>
             <a:endParaRPr lang="en-US"/>
           </a:p>
@@ -3666,6 +3673,13 @@
   <p:clrMapOvr>
     <a:masterClrMapping/>
   </p:clrMapOvr>
+  <p:timing>
+    <p:tnLst>
+      <p:par>
+        <p:cTn id="1" dur="indefinite" restart="never" nodeType="tmRoot"/>
+      </p:par>
+    </p:tnLst>
+  </p:timing>
 </p:sld>
 </file>
 
@@ -3702,8 +3716,8 @@
           <a:lstStyle/>
           <a:p>
             <a:r>
-              <a:rPr lang="en-US" dirty="0" err="1" smtClean="0"/>
-              <a:t>Backticks</a:t>
+              <a:rPr lang="en-US" dirty="0" smtClean="0"/>
+              <a:t>Comments</a:t>
             </a:r>
             <a:endParaRPr lang="en-US" dirty="0"/>
           </a:p>
@@ -3724,7 +3738,34 @@
           <a:bodyPr/>
           <a:lstStyle/>
           <a:p>
-            <a:endParaRPr lang="en-US"/>
+            <a:r>
+              <a:rPr lang="en-US" dirty="0" smtClean="0"/>
+              <a:t>It is good practice to explain all but the most trivial source code, both to yourself and to others.</a:t>
+            </a:r>
+          </a:p>
+          <a:p>
+            <a:r>
+              <a:rPr lang="en-US" dirty="0" smtClean="0"/>
+              <a:t>Comments are the way to explain source code from a developer point of view.</a:t>
+            </a:r>
+          </a:p>
+          <a:p>
+            <a:r>
+              <a:rPr lang="en-US" dirty="0" smtClean="0"/>
+              <a:t>In shell (and many other) scripting languages, anything followed by </a:t>
+            </a:r>
+            <a:r>
+              <a:rPr lang="en-US" b="1" dirty="0" smtClean="0">
+                <a:latin typeface="Courier New"/>
+                <a:cs typeface="Courier New"/>
+              </a:rPr>
+              <a:t>#</a:t>
+            </a:r>
+            <a:r>
+              <a:rPr lang="en-US" dirty="0" smtClean="0"/>
+              <a:t> is a comment</a:t>
+            </a:r>
+            <a:endParaRPr lang="en-US" dirty="0"/>
           </a:p>
         </p:txBody>
       </p:sp>
@@ -3770,7 +3811,7 @@
           <a:p>
             <a:r>
               <a:rPr lang="en-US" dirty="0" smtClean="0"/>
-              <a:t>Comments</a:t>
+              <a:t>Variables</a:t>
             </a:r>
             <a:endParaRPr lang="en-US" dirty="0"/>
           </a:p>
@@ -3788,10 +3829,71 @@
         </p:nvSpPr>
         <p:spPr/>
         <p:txBody>
-          <a:bodyPr/>
-          <a:lstStyle/>
-          <a:p>
-            <a:endParaRPr lang="en-US"/>
+          <a:bodyPr>
+            <a:normAutofit/>
+          </a:bodyPr>
+          <a:lstStyle/>
+          <a:p>
+            <a:r>
+              <a:rPr lang="en-US" dirty="0" smtClean="0"/>
+              <a:t>As we saw in the UNIX environment, variables are things with a fixed name (e.g. "PATH") and a variable value.</a:t>
+            </a:r>
+          </a:p>
+          <a:p>
+            <a:r>
+              <a:rPr lang="en-US" dirty="0" smtClean="0"/>
+              <a:t>Variables can be assigned from simple values (or other variables):</a:t>
+            </a:r>
+            <a:br>
+              <a:rPr lang="en-US" dirty="0" smtClean="0"/>
+            </a:br>
+            <a:r>
+              <a:rPr lang="en-US" sz="2800" dirty="0" smtClean="0">
+                <a:latin typeface="Courier New"/>
+                <a:cs typeface="Courier New"/>
+              </a:rPr>
+              <a:t>$ </a:t>
+            </a:r>
+            <a:r>
+              <a:rPr lang="en-US" sz="2800" dirty="0" err="1" smtClean="0">
+                <a:latin typeface="Courier New"/>
+                <a:cs typeface="Courier New"/>
+              </a:rPr>
+              <a:t>myvar</a:t>
+            </a:r>
+            <a:r>
+              <a:rPr lang="en-US" sz="2800" dirty="0" smtClean="0">
+                <a:latin typeface="Courier New"/>
+                <a:cs typeface="Courier New"/>
+              </a:rPr>
+              <a:t>='Hello World!'; echo $</a:t>
+            </a:r>
+            <a:r>
+              <a:rPr lang="en-US" sz="2800" dirty="0" err="1" smtClean="0">
+                <a:latin typeface="Courier New"/>
+                <a:cs typeface="Courier New"/>
+              </a:rPr>
+              <a:t>myvar</a:t>
+            </a:r>
+            <a:endParaRPr lang="en-US" dirty="0" smtClean="0">
+              <a:latin typeface="Courier New"/>
+              <a:cs typeface="Courier New"/>
+            </a:endParaRPr>
+          </a:p>
+          <a:p>
+            <a:r>
+              <a:rPr lang="en-US" dirty="0" smtClean="0"/>
+              <a:t>Variables can also be assigned from the output of commands, using "</a:t>
+            </a:r>
+            <a:r>
+              <a:rPr lang="en-US" dirty="0" err="1" smtClean="0"/>
+              <a:t>backticks</a:t>
+            </a:r>
+            <a:r>
+              <a:rPr lang="en-US" dirty="0" smtClean="0"/>
+              <a:t>"</a:t>
+            </a:r>
+            <a:endParaRPr lang="en-US" dirty="0"/>
           </a:p>
         </p:txBody>
       </p:sp>
@@ -3836,8 +3938,8 @@
           <a:lstStyle/>
           <a:p>
             <a:r>
-              <a:rPr lang="en-US" dirty="0" smtClean="0"/>
-              <a:t>Executable bit</a:t>
+              <a:rPr lang="en-US" dirty="0" err="1" smtClean="0"/>
+              <a:t>Backticks</a:t>
             </a:r>
             <a:endParaRPr lang="en-US" dirty="0"/>
           </a:p>
@@ -3855,10 +3957,253 @@
         </p:nvSpPr>
         <p:spPr/>
         <p:txBody>
-          <a:bodyPr/>
-          <a:lstStyle/>
-          <a:p>
-            <a:endParaRPr lang="en-US"/>
+          <a:bodyPr>
+            <a:normAutofit/>
+          </a:bodyPr>
+          <a:lstStyle/>
+          <a:p>
+            <a:r>
+              <a:rPr lang="en-US" dirty="0" smtClean="0"/>
+              <a:t>For example, to </a:t>
+            </a:r>
+            <a:r>
+              <a:rPr lang="en-US" dirty="0" smtClean="0"/>
+              <a:t>assign a file listing to a variable:</a:t>
+            </a:r>
+            <a:br>
+              <a:rPr lang="en-US" dirty="0" smtClean="0"/>
+            </a:br>
+            <a:r>
+              <a:rPr lang="en-US" sz="2400" dirty="0" smtClean="0">
+                <a:latin typeface="Courier New"/>
+                <a:cs typeface="Courier New"/>
+              </a:rPr>
+              <a:t>$ </a:t>
+            </a:r>
+            <a:r>
+              <a:rPr lang="en-US" sz="2400" dirty="0" err="1" smtClean="0">
+                <a:latin typeface="Courier New"/>
+                <a:cs typeface="Courier New"/>
+              </a:rPr>
+              <a:t>mylist</a:t>
+            </a:r>
+            <a:r>
+              <a:rPr lang="en-US" sz="2400" dirty="0" smtClean="0">
+                <a:latin typeface="Courier New"/>
+                <a:cs typeface="Courier New"/>
+              </a:rPr>
+              <a:t>=`</a:t>
+            </a:r>
+            <a:r>
+              <a:rPr lang="en-US" sz="2400" dirty="0" err="1" smtClean="0">
+                <a:latin typeface="Courier New"/>
+                <a:cs typeface="Courier New"/>
+              </a:rPr>
+              <a:t>ls</a:t>
+            </a:r>
+            <a:r>
+              <a:rPr lang="en-US" sz="2400" dirty="0" smtClean="0">
+                <a:latin typeface="Courier New"/>
+                <a:cs typeface="Courier New"/>
+              </a:rPr>
+              <a:t>`</a:t>
+            </a:r>
+            <a:endParaRPr lang="en-US" dirty="0" smtClean="0">
+              <a:latin typeface="Courier New"/>
+              <a:cs typeface="Courier New"/>
+            </a:endParaRPr>
+          </a:p>
+          <a:p>
+            <a:r>
+              <a:rPr lang="en-US" dirty="0" smtClean="0"/>
+              <a:t>To assign a list of all text files except for </a:t>
+            </a:r>
+            <a:r>
+              <a:rPr lang="en-US" dirty="0" err="1" smtClean="0"/>
+              <a:t>README.txt</a:t>
+            </a:r>
+            <a:r>
+              <a:rPr lang="en-US" dirty="0" smtClean="0"/>
+              <a:t>:</a:t>
+            </a:r>
+            <a:br>
+              <a:rPr lang="en-US" dirty="0" smtClean="0"/>
+            </a:br>
+            <a:r>
+              <a:rPr lang="en-US" sz="2400" dirty="0" smtClean="0">
+                <a:latin typeface="Courier New"/>
+                <a:cs typeface="Courier New"/>
+              </a:rPr>
+              <a:t>$ </a:t>
+            </a:r>
+            <a:r>
+              <a:rPr lang="en-US" sz="2400" dirty="0" err="1" smtClean="0">
+                <a:latin typeface="Courier New"/>
+                <a:cs typeface="Courier New"/>
+              </a:rPr>
+              <a:t>mytexts</a:t>
+            </a:r>
+            <a:r>
+              <a:rPr lang="en-US" sz="2400" dirty="0" smtClean="0">
+                <a:latin typeface="Courier New"/>
+                <a:cs typeface="Courier New"/>
+              </a:rPr>
+              <a:t>=`</a:t>
+            </a:r>
+            <a:r>
+              <a:rPr lang="en-US" sz="2400" dirty="0" err="1" smtClean="0">
+                <a:latin typeface="Courier New"/>
+                <a:cs typeface="Courier New"/>
+              </a:rPr>
+              <a:t>ls</a:t>
+            </a:r>
+            <a:r>
+              <a:rPr lang="en-US" sz="2400" dirty="0" smtClean="0">
+                <a:latin typeface="Courier New"/>
+                <a:cs typeface="Courier New"/>
+              </a:rPr>
+              <a:t> | </a:t>
+            </a:r>
+            <a:r>
+              <a:rPr lang="en-US" sz="2400" dirty="0" err="1" smtClean="0">
+                <a:latin typeface="Courier New"/>
+                <a:cs typeface="Courier New"/>
+              </a:rPr>
+              <a:t>grep</a:t>
+            </a:r>
+            <a:r>
+              <a:rPr lang="en-US" sz="2400" dirty="0" smtClean="0">
+                <a:latin typeface="Courier New"/>
+                <a:cs typeface="Courier New"/>
+              </a:rPr>
+              <a:t> -</a:t>
+            </a:r>
+            <a:r>
+              <a:rPr lang="en-US" sz="2400" dirty="0" err="1" smtClean="0">
+                <a:latin typeface="Courier New"/>
+                <a:cs typeface="Courier New"/>
+              </a:rPr>
+              <a:t>v</a:t>
+            </a:r>
+            <a:r>
+              <a:rPr lang="en-US" sz="2400" dirty="0" smtClean="0">
+                <a:latin typeface="Courier New"/>
+                <a:cs typeface="Courier New"/>
+              </a:rPr>
+              <a:t> '</a:t>
+            </a:r>
+            <a:r>
+              <a:rPr lang="en-US" sz="2400" dirty="0" err="1" smtClean="0">
+                <a:latin typeface="Courier New"/>
+                <a:cs typeface="Courier New"/>
+              </a:rPr>
+              <a:t>README.txt</a:t>
+            </a:r>
+            <a:r>
+              <a:rPr lang="en-US" sz="2400" dirty="0" smtClean="0">
+                <a:latin typeface="Courier New"/>
+                <a:cs typeface="Courier New"/>
+              </a:rPr>
+              <a:t>'`</a:t>
+            </a:r>
+          </a:p>
+          <a:p>
+            <a:r>
+              <a:rPr lang="en-US" dirty="0" smtClean="0"/>
+              <a:t>In place of `</a:t>
+            </a:r>
+            <a:r>
+              <a:rPr lang="en-US" dirty="0" err="1" smtClean="0"/>
+              <a:t>backticks</a:t>
+            </a:r>
+            <a:r>
+              <a:rPr lang="en-US" dirty="0" smtClean="0"/>
+              <a:t>`, this works also:</a:t>
+            </a:r>
+            <a:br>
+              <a:rPr lang="en-US" dirty="0" smtClean="0"/>
+            </a:br>
+            <a:r>
+              <a:rPr lang="en-US" sz="2400" dirty="0" smtClean="0">
+                <a:latin typeface="Courier New"/>
+                <a:cs typeface="Courier New"/>
+              </a:rPr>
+              <a:t>$ </a:t>
+            </a:r>
+            <a:r>
+              <a:rPr lang="en-US" sz="2400" dirty="0" err="1" smtClean="0">
+                <a:latin typeface="Courier New"/>
+                <a:cs typeface="Courier New"/>
+              </a:rPr>
+              <a:t>mytexts</a:t>
+            </a:r>
+            <a:r>
+              <a:rPr lang="en-US" sz="2400" dirty="0" smtClean="0">
+                <a:latin typeface="Courier New"/>
+                <a:cs typeface="Courier New"/>
+              </a:rPr>
+              <a:t>=$(</a:t>
+            </a:r>
+            <a:r>
+              <a:rPr lang="en-US" sz="2400" dirty="0" err="1" smtClean="0">
+                <a:latin typeface="Courier New"/>
+                <a:cs typeface="Courier New"/>
+              </a:rPr>
+              <a:t>ls</a:t>
+            </a:r>
+            <a:r>
+              <a:rPr lang="en-US" sz="2400" dirty="0" smtClean="0">
+                <a:latin typeface="Courier New"/>
+                <a:cs typeface="Courier New"/>
+              </a:rPr>
+              <a:t> | </a:t>
+            </a:r>
+            <a:r>
+              <a:rPr lang="en-US" sz="2400" dirty="0" err="1" smtClean="0">
+                <a:latin typeface="Courier New"/>
+                <a:cs typeface="Courier New"/>
+              </a:rPr>
+              <a:t>grep</a:t>
+            </a:r>
+            <a:r>
+              <a:rPr lang="en-US" sz="2400" dirty="0" smtClean="0">
+                <a:latin typeface="Courier New"/>
+                <a:cs typeface="Courier New"/>
+              </a:rPr>
+              <a:t> -</a:t>
+            </a:r>
+            <a:r>
+              <a:rPr lang="en-US" sz="2400" dirty="0" err="1" smtClean="0">
+                <a:latin typeface="Courier New"/>
+                <a:cs typeface="Courier New"/>
+              </a:rPr>
+              <a:t>v</a:t>
+            </a:r>
+            <a:r>
+              <a:rPr lang="en-US" sz="2400" dirty="0" smtClean="0">
+                <a:latin typeface="Courier New"/>
+                <a:cs typeface="Courier New"/>
+              </a:rPr>
+              <a:t> '</a:t>
+            </a:r>
+            <a:r>
+              <a:rPr lang="en-US" sz="2400" dirty="0" err="1" smtClean="0">
+                <a:latin typeface="Courier New"/>
+                <a:cs typeface="Courier New"/>
+              </a:rPr>
+              <a:t>README.txt</a:t>
+            </a:r>
+            <a:r>
+              <a:rPr lang="en-US" sz="2400" dirty="0" smtClean="0">
+                <a:latin typeface="Courier New"/>
+                <a:cs typeface="Courier New"/>
+              </a:rPr>
+              <a:t>')</a:t>
+            </a:r>
+            <a:endParaRPr lang="en-US" dirty="0" smtClean="0">
+              <a:latin typeface="Courier New"/>
+              <a:cs typeface="Courier New"/>
+            </a:endParaRPr>
           </a:p>
         </p:txBody>
       </p:sp>
@@ -3904,6 +4249,1183 @@
           <a:p>
             <a:r>
               <a:rPr lang="en-US" dirty="0" smtClean="0"/>
+              <a:t>Conditionals</a:t>
+            </a:r>
+            <a:endParaRPr lang="en-US" dirty="0"/>
+          </a:p>
+        </p:txBody>
+      </p:sp>
+      <p:sp>
+        <p:nvSpPr>
+          <p:cNvPr id="3" name="Content Placeholder 2"/>
+          <p:cNvSpPr>
+            <a:spLocks noGrp="1"/>
+          </p:cNvSpPr>
+          <p:nvPr>
+            <p:ph idx="1"/>
+          </p:nvPr>
+        </p:nvSpPr>
+        <p:spPr/>
+        <p:txBody>
+          <a:bodyPr/>
+          <a:lstStyle/>
+          <a:p>
+            <a:r>
+              <a:rPr lang="en-US" dirty="0" smtClean="0"/>
+              <a:t>Maybe you need to do something only if a certain condition is true. For example, only create a file if it doesn't exist yet:</a:t>
+            </a:r>
+            <a:br>
+              <a:rPr lang="en-US" dirty="0" smtClean="0"/>
+            </a:br>
+            <a:r>
+              <a:rPr lang="en-US" dirty="0" smtClean="0">
+                <a:latin typeface="Courier New"/>
+                <a:cs typeface="Courier New"/>
+              </a:rPr>
+              <a:t>$ if [ ! -</a:t>
+            </a:r>
+            <a:r>
+              <a:rPr lang="en-US" dirty="0" err="1" smtClean="0">
+                <a:latin typeface="Courier New"/>
+                <a:cs typeface="Courier New"/>
+              </a:rPr>
+              <a:t>e</a:t>
+            </a:r>
+            <a:r>
+              <a:rPr lang="en-US" dirty="0" smtClean="0">
+                <a:latin typeface="Courier New"/>
+                <a:cs typeface="Courier New"/>
+              </a:rPr>
+              <a:t> "filename" ]; then</a:t>
+            </a:r>
+            <a:br>
+              <a:rPr lang="en-US" dirty="0" smtClean="0">
+                <a:latin typeface="Courier New"/>
+                <a:cs typeface="Courier New"/>
+              </a:rPr>
+            </a:br>
+            <a:r>
+              <a:rPr lang="en-US" dirty="0" smtClean="0">
+                <a:latin typeface="Courier New"/>
+                <a:cs typeface="Courier New"/>
+              </a:rPr>
+              <a:t>$ touch filename</a:t>
+            </a:r>
+            <a:br>
+              <a:rPr lang="en-US" dirty="0" smtClean="0">
+                <a:latin typeface="Courier New"/>
+                <a:cs typeface="Courier New"/>
+              </a:rPr>
+            </a:br>
+            <a:r>
+              <a:rPr lang="en-US" dirty="0" smtClean="0">
+                <a:latin typeface="Courier New"/>
+                <a:cs typeface="Courier New"/>
+              </a:rPr>
+              <a:t>$ </a:t>
+            </a:r>
+            <a:r>
+              <a:rPr lang="en-US" dirty="0" err="1" smtClean="0">
+                <a:latin typeface="Courier New"/>
+                <a:cs typeface="Courier New"/>
+              </a:rPr>
+              <a:t>fi</a:t>
+            </a:r>
+            <a:endParaRPr lang="en-US" dirty="0">
+              <a:latin typeface="Courier New"/>
+              <a:cs typeface="Courier New"/>
+            </a:endParaRPr>
+          </a:p>
+        </p:txBody>
+      </p:sp>
+    </p:spTree>
+  </p:cSld>
+  <p:clrMapOvr>
+    <a:masterClrMapping/>
+  </p:clrMapOvr>
+</p:sld>
+</file>
+
+<file path=ppt/slides/slide14.xml><?xml version="1.0" encoding="utf-8"?>
+<p:sld xmlns:a="http://schemas.openxmlformats.org/drawingml/2006/main" xmlns:r="http://schemas.openxmlformats.org/officeDocument/2006/relationships" xmlns:mc="http://schemas.openxmlformats.org/markup-compatibility/2006" xmlns:mv="urn:schemas-microsoft-com:mac:vml" xmlns:p="http://schemas.openxmlformats.org/presentationml/2006/main" mc:Ignorable="mv" mc:PreserveAttributes="mv:*">
+  <p:cSld>
+    <p:spTree>
+      <p:nvGrpSpPr>
+        <p:cNvPr id="1" name=""/>
+        <p:cNvGrpSpPr/>
+        <p:nvPr/>
+      </p:nvGrpSpPr>
+      <p:grpSpPr>
+        <a:xfrm>
+          <a:off x="0" y="0"/>
+          <a:ext cx="0" cy="0"/>
+          <a:chOff x="0" y="0"/>
+          <a:chExt cx="0" cy="0"/>
+        </a:xfrm>
+      </p:grpSpPr>
+      <p:sp>
+        <p:nvSpPr>
+          <p:cNvPr id="2" name="Title 1"/>
+          <p:cNvSpPr>
+            <a:spLocks noGrp="1"/>
+          </p:cNvSpPr>
+          <p:nvPr>
+            <p:ph type="title"/>
+          </p:nvPr>
+        </p:nvSpPr>
+        <p:spPr/>
+        <p:txBody>
+          <a:bodyPr/>
+          <a:lstStyle/>
+          <a:p>
+            <a:r>
+              <a:rPr lang="en-US" dirty="0" smtClean="0"/>
+              <a:t>Loops</a:t>
+            </a:r>
+            <a:endParaRPr lang="en-US" dirty="0"/>
+          </a:p>
+        </p:txBody>
+      </p:sp>
+      <p:sp>
+        <p:nvSpPr>
+          <p:cNvPr id="3" name="Content Placeholder 2"/>
+          <p:cNvSpPr>
+            <a:spLocks noGrp="1"/>
+          </p:cNvSpPr>
+          <p:nvPr>
+            <p:ph idx="1"/>
+          </p:nvPr>
+        </p:nvSpPr>
+        <p:spPr/>
+        <p:txBody>
+          <a:bodyPr/>
+          <a:lstStyle/>
+          <a:p>
+            <a:r>
+              <a:rPr lang="en-US" dirty="0" smtClean="0"/>
+              <a:t>Often you need to do the same thing multiple times, e.g. loop over all files (words):</a:t>
+            </a:r>
+            <a:br>
+              <a:rPr lang="en-US" dirty="0" smtClean="0"/>
+            </a:br>
+            <a:r>
+              <a:rPr lang="en-US" dirty="0" smtClean="0">
+                <a:latin typeface="Courier New"/>
+                <a:cs typeface="Courier New"/>
+              </a:rPr>
+              <a:t>$ </a:t>
+            </a:r>
+            <a:r>
+              <a:rPr lang="en-US" dirty="0" err="1" smtClean="0">
+                <a:latin typeface="Courier New"/>
+                <a:cs typeface="Courier New"/>
+              </a:rPr>
+              <a:t>file_list</a:t>
+            </a:r>
+            <a:r>
+              <a:rPr lang="en-US" dirty="0" smtClean="0">
+                <a:latin typeface="Courier New"/>
+                <a:cs typeface="Courier New"/>
+              </a:rPr>
+              <a:t>=`</a:t>
+            </a:r>
+            <a:r>
+              <a:rPr lang="en-US" dirty="0" err="1" smtClean="0">
+                <a:latin typeface="Courier New"/>
+                <a:cs typeface="Courier New"/>
+              </a:rPr>
+              <a:t>ls</a:t>
+            </a:r>
+            <a:r>
+              <a:rPr lang="en-US" dirty="0" smtClean="0">
+                <a:latin typeface="Courier New"/>
+                <a:cs typeface="Courier New"/>
+              </a:rPr>
+              <a:t>`</a:t>
+            </a:r>
+            <a:br>
+              <a:rPr lang="en-US" dirty="0" smtClean="0">
+                <a:latin typeface="Courier New"/>
+                <a:cs typeface="Courier New"/>
+              </a:rPr>
+            </a:br>
+            <a:r>
+              <a:rPr lang="en-US" dirty="0" smtClean="0">
+                <a:latin typeface="Courier New"/>
+                <a:cs typeface="Courier New"/>
+              </a:rPr>
+              <a:t>$ for file in $</a:t>
+            </a:r>
+            <a:r>
+              <a:rPr lang="en-US" dirty="0" err="1" smtClean="0">
+                <a:latin typeface="Courier New"/>
+                <a:cs typeface="Courier New"/>
+              </a:rPr>
+              <a:t>file_list</a:t>
+            </a:r>
+            <a:r>
+              <a:rPr lang="en-US" dirty="0" smtClean="0">
+                <a:latin typeface="Courier New"/>
+                <a:cs typeface="Courier New"/>
+              </a:rPr>
+              <a:t>; do</a:t>
+            </a:r>
+            <a:br>
+              <a:rPr lang="en-US" dirty="0" smtClean="0">
+                <a:latin typeface="Courier New"/>
+                <a:cs typeface="Courier New"/>
+              </a:rPr>
+            </a:br>
+            <a:r>
+              <a:rPr lang="en-US" dirty="0" smtClean="0">
+                <a:latin typeface="Courier New"/>
+                <a:cs typeface="Courier New"/>
+              </a:rPr>
+              <a:t>$ echo $file</a:t>
+            </a:r>
+            <a:br>
+              <a:rPr lang="en-US" dirty="0" smtClean="0">
+                <a:latin typeface="Courier New"/>
+                <a:cs typeface="Courier New"/>
+              </a:rPr>
+            </a:br>
+            <a:r>
+              <a:rPr lang="en-US" dirty="0" smtClean="0">
+                <a:latin typeface="Courier New"/>
+                <a:cs typeface="Courier New"/>
+              </a:rPr>
+              <a:t>$ done</a:t>
+            </a:r>
+          </a:p>
+          <a:p>
+            <a:r>
+              <a:rPr lang="en-US" dirty="0" smtClean="0"/>
+              <a:t>Shell scripting also has loops with counter variables, "while" loops, etc.</a:t>
+            </a:r>
+            <a:endParaRPr lang="en-US" dirty="0"/>
+          </a:p>
+        </p:txBody>
+      </p:sp>
+    </p:spTree>
+  </p:cSld>
+  <p:clrMapOvr>
+    <a:masterClrMapping/>
+  </p:clrMapOvr>
+</p:sld>
+</file>
+
+<file path=ppt/slides/slide15.xml><?xml version="1.0" encoding="utf-8"?>
+<p:sld xmlns:a="http://schemas.openxmlformats.org/drawingml/2006/main" xmlns:r="http://schemas.openxmlformats.org/officeDocument/2006/relationships" xmlns:mc="http://schemas.openxmlformats.org/markup-compatibility/2006" xmlns:mv="urn:schemas-microsoft-com:mac:vml" xmlns:p="http://schemas.openxmlformats.org/presentationml/2006/main" mc:Ignorable="mv" mc:PreserveAttributes="mv:*">
+  <p:cSld>
+    <p:spTree>
+      <p:nvGrpSpPr>
+        <p:cNvPr id="1" name=""/>
+        <p:cNvGrpSpPr/>
+        <p:nvPr/>
+      </p:nvGrpSpPr>
+      <p:grpSpPr>
+        <a:xfrm>
+          <a:off x="0" y="0"/>
+          <a:ext cx="0" cy="0"/>
+          <a:chOff x="0" y="0"/>
+          <a:chExt cx="0" cy="0"/>
+        </a:xfrm>
+      </p:grpSpPr>
+      <p:sp>
+        <p:nvSpPr>
+          <p:cNvPr id="2" name="Title 1"/>
+          <p:cNvSpPr>
+            <a:spLocks noGrp="1"/>
+          </p:cNvSpPr>
+          <p:nvPr>
+            <p:ph type="title"/>
+          </p:nvPr>
+        </p:nvSpPr>
+        <p:spPr/>
+        <p:txBody>
+          <a:bodyPr/>
+          <a:lstStyle/>
+          <a:p>
+            <a:r>
+              <a:rPr lang="en-US" dirty="0" smtClean="0"/>
+              <a:t>Tests</a:t>
+            </a:r>
+            <a:endParaRPr lang="en-US" dirty="0"/>
+          </a:p>
+        </p:txBody>
+      </p:sp>
+      <p:sp>
+        <p:nvSpPr>
+          <p:cNvPr id="6" name="Text Placeholder 5"/>
+          <p:cNvSpPr>
+            <a:spLocks noGrp="1"/>
+          </p:cNvSpPr>
+          <p:nvPr>
+            <p:ph type="body" idx="1"/>
+          </p:nvPr>
+        </p:nvSpPr>
+        <p:spPr/>
+        <p:txBody>
+          <a:bodyPr/>
+          <a:lstStyle/>
+          <a:p>
+            <a:r>
+              <a:rPr lang="en-US" dirty="0" smtClean="0"/>
+              <a:t>Comparisons</a:t>
+            </a:r>
+            <a:endParaRPr lang="en-US" dirty="0"/>
+          </a:p>
+        </p:txBody>
+      </p:sp>
+      <p:graphicFrame>
+        <p:nvGraphicFramePr>
+          <p:cNvPr id="10" name="Content Placeholder 9"/>
+          <p:cNvGraphicFramePr>
+            <a:graphicFrameLocks noGrp="1"/>
+          </p:cNvGraphicFramePr>
+          <p:nvPr>
+            <p:ph sz="half" idx="2"/>
+          </p:nvPr>
+        </p:nvGraphicFramePr>
+        <p:xfrm>
+          <a:off x="457200" y="2174875"/>
+          <a:ext cx="4040188" cy="4079240"/>
+        </p:xfrm>
+        <a:graphic>
+          <a:graphicData uri="http://schemas.openxmlformats.org/drawingml/2006/table">
+            <a:tbl>
+              <a:tblPr firstRow="1" bandRow="1">
+                <a:tableStyleId>{5C22544A-7EE6-4342-B048-85BDC9FD1C3A}</a:tableStyleId>
+              </a:tblPr>
+              <a:tblGrid>
+                <a:gridCol w="1066800"/>
+                <a:gridCol w="2973388"/>
+              </a:tblGrid>
+              <a:tr h="370840">
+                <a:tc>
+                  <a:txBody>
+                    <a:bodyPr/>
+                    <a:lstStyle/>
+                    <a:p>
+                      <a:r>
+                        <a:rPr lang="en-US" dirty="0" smtClean="0"/>
+                        <a:t>Operator</a:t>
+                      </a:r>
+                      <a:endParaRPr lang="en-US" dirty="0"/>
+                    </a:p>
+                  </a:txBody>
+                  <a:tcPr/>
+                </a:tc>
+                <a:tc>
+                  <a:txBody>
+                    <a:bodyPr/>
+                    <a:lstStyle/>
+                    <a:p>
+                      <a:r>
+                        <a:rPr lang="en-US" dirty="0" smtClean="0"/>
+                        <a:t>Meaning</a:t>
+                      </a:r>
+                      <a:endParaRPr lang="en-US" dirty="0"/>
+                    </a:p>
+                  </a:txBody>
+                  <a:tcPr/>
+                </a:tc>
+              </a:tr>
+              <a:tr h="370840">
+                <a:tc>
+                  <a:txBody>
+                    <a:bodyPr/>
+                    <a:lstStyle/>
+                    <a:p>
+                      <a:r>
+                        <a:rPr lang="en-US" dirty="0" smtClean="0"/>
+                        <a:t>-</a:t>
+                      </a:r>
+                      <a:r>
+                        <a:rPr lang="en-US" dirty="0" err="1" smtClean="0"/>
+                        <a:t>eq</a:t>
+                      </a:r>
+                      <a:r>
+                        <a:rPr lang="en-US" dirty="0" smtClean="0"/>
+                        <a:t> or =</a:t>
+                      </a:r>
+                      <a:r>
+                        <a:rPr lang="en-US" baseline="0" dirty="0" smtClean="0"/>
+                        <a:t>=</a:t>
+                      </a:r>
+                      <a:endParaRPr lang="en-US" dirty="0"/>
+                    </a:p>
+                  </a:txBody>
+                  <a:tcPr/>
+                </a:tc>
+                <a:tc>
+                  <a:txBody>
+                    <a:bodyPr/>
+                    <a:lstStyle/>
+                    <a:p>
+                      <a:r>
+                        <a:rPr lang="en-US" dirty="0" smtClean="0"/>
+                        <a:t>String equals</a:t>
+                      </a:r>
+                      <a:endParaRPr lang="en-US" dirty="0"/>
+                    </a:p>
+                  </a:txBody>
+                  <a:tcPr/>
+                </a:tc>
+              </a:tr>
+              <a:tr h="370840">
+                <a:tc>
+                  <a:txBody>
+                    <a:bodyPr/>
+                    <a:lstStyle/>
+                    <a:p>
+                      <a:r>
+                        <a:rPr lang="en-US" dirty="0" smtClean="0"/>
+                        <a:t>-ne or !=</a:t>
+                      </a:r>
+                      <a:endParaRPr lang="en-US" dirty="0"/>
+                    </a:p>
+                  </a:txBody>
+                  <a:tcPr/>
+                </a:tc>
+                <a:tc>
+                  <a:txBody>
+                    <a:bodyPr/>
+                    <a:lstStyle/>
+                    <a:p>
+                      <a:r>
+                        <a:rPr lang="en-US" dirty="0" smtClean="0"/>
+                        <a:t>String not equals</a:t>
+                      </a:r>
+                      <a:endParaRPr lang="en-US" dirty="0"/>
+                    </a:p>
+                  </a:txBody>
+                  <a:tcPr/>
+                </a:tc>
+              </a:tr>
+              <a:tr h="370840">
+                <a:tc>
+                  <a:txBody>
+                    <a:bodyPr/>
+                    <a:lstStyle/>
+                    <a:p>
+                      <a:r>
+                        <a:rPr lang="en-US" dirty="0" smtClean="0"/>
+                        <a:t>-</a:t>
+                      </a:r>
+                      <a:r>
+                        <a:rPr lang="en-US" dirty="0" err="1" smtClean="0"/>
+                        <a:t>lt</a:t>
+                      </a:r>
+                      <a:r>
+                        <a:rPr lang="en-US" dirty="0" smtClean="0"/>
+                        <a:t> or \&lt;</a:t>
+                      </a:r>
+                      <a:endParaRPr lang="en-US" dirty="0"/>
+                    </a:p>
+                  </a:txBody>
+                  <a:tcPr/>
+                </a:tc>
+                <a:tc>
+                  <a:txBody>
+                    <a:bodyPr/>
+                    <a:lstStyle/>
+                    <a:p>
+                      <a:r>
+                        <a:rPr lang="en-US" dirty="0" smtClean="0"/>
+                        <a:t>String less than</a:t>
+                      </a:r>
+                      <a:endParaRPr lang="en-US" dirty="0"/>
+                    </a:p>
+                  </a:txBody>
+                  <a:tcPr/>
+                </a:tc>
+              </a:tr>
+              <a:tr h="370840">
+                <a:tc>
+                  <a:txBody>
+                    <a:bodyPr/>
+                    <a:lstStyle/>
+                    <a:p>
+                      <a:r>
+                        <a:rPr lang="en-US" dirty="0" smtClean="0"/>
+                        <a:t>-</a:t>
+                      </a:r>
+                      <a:r>
+                        <a:rPr lang="en-US" dirty="0" err="1" smtClean="0"/>
+                        <a:t>gt</a:t>
+                      </a:r>
+                      <a:r>
+                        <a:rPr lang="en-US" dirty="0" smtClean="0"/>
+                        <a:t> or \&gt;</a:t>
+                      </a:r>
+                      <a:endParaRPr lang="en-US" dirty="0"/>
+                    </a:p>
+                  </a:txBody>
+                  <a:tcPr/>
+                </a:tc>
+                <a:tc>
+                  <a:txBody>
+                    <a:bodyPr/>
+                    <a:lstStyle/>
+                    <a:p>
+                      <a:r>
+                        <a:rPr lang="en-US" dirty="0" smtClean="0"/>
+                        <a:t>String greater than</a:t>
+                      </a:r>
+                      <a:endParaRPr lang="en-US" dirty="0"/>
+                    </a:p>
+                  </a:txBody>
+                  <a:tcPr/>
+                </a:tc>
+              </a:tr>
+              <a:tr h="370840">
+                <a:tc>
+                  <a:txBody>
+                    <a:bodyPr/>
+                    <a:lstStyle/>
+                    <a:p>
+                      <a:r>
+                        <a:rPr lang="en-US" dirty="0" smtClean="0"/>
+                        <a:t>-</a:t>
+                      </a:r>
+                      <a:r>
+                        <a:rPr lang="en-US" dirty="0" err="1" smtClean="0"/>
+                        <a:t>z</a:t>
+                      </a:r>
+                      <a:endParaRPr lang="en-US" dirty="0"/>
+                    </a:p>
+                  </a:txBody>
+                  <a:tcPr/>
+                </a:tc>
+                <a:tc>
+                  <a:txBody>
+                    <a:bodyPr/>
+                    <a:lstStyle/>
+                    <a:p>
+                      <a:r>
+                        <a:rPr lang="en-US" dirty="0" smtClean="0"/>
+                        <a:t>String is empty</a:t>
+                      </a:r>
+                      <a:endParaRPr lang="en-US" dirty="0"/>
+                    </a:p>
+                  </a:txBody>
+                  <a:tcPr/>
+                </a:tc>
+              </a:tr>
+              <a:tr h="370840">
+                <a:tc>
+                  <a:txBody>
+                    <a:bodyPr/>
+                    <a:lstStyle/>
+                    <a:p>
+                      <a:r>
+                        <a:rPr lang="en-US" dirty="0" smtClean="0"/>
+                        <a:t>-</a:t>
+                      </a:r>
+                      <a:r>
+                        <a:rPr lang="en-US" dirty="0" err="1" smtClean="0"/>
+                        <a:t>n</a:t>
+                      </a:r>
+                      <a:endParaRPr lang="en-US" dirty="0"/>
+                    </a:p>
+                  </a:txBody>
+                  <a:tcPr/>
+                </a:tc>
+                <a:tc>
+                  <a:txBody>
+                    <a:bodyPr/>
+                    <a:lstStyle/>
+                    <a:p>
+                      <a:r>
+                        <a:rPr lang="en-US" dirty="0" smtClean="0"/>
+                        <a:t>String not empty</a:t>
+                      </a:r>
+                      <a:endParaRPr lang="en-US" dirty="0"/>
+                    </a:p>
+                  </a:txBody>
+                  <a:tcPr/>
+                </a:tc>
+              </a:tr>
+              <a:tr h="370840">
+                <a:tc>
+                  <a:txBody>
+                    <a:bodyPr/>
+                    <a:lstStyle/>
+                    <a:p>
+                      <a:r>
+                        <a:rPr lang="en-US" dirty="0" smtClean="0"/>
+                        <a:t>&gt;</a:t>
+                      </a:r>
+                      <a:endParaRPr lang="en-US" dirty="0"/>
+                    </a:p>
+                  </a:txBody>
+                  <a:tcPr/>
+                </a:tc>
+                <a:tc>
+                  <a:txBody>
+                    <a:bodyPr/>
+                    <a:lstStyle/>
+                    <a:p>
+                      <a:r>
+                        <a:rPr lang="en-US" dirty="0" smtClean="0"/>
+                        <a:t>Num greater than</a:t>
+                      </a:r>
+                      <a:endParaRPr lang="en-US" dirty="0"/>
+                    </a:p>
+                  </a:txBody>
+                  <a:tcPr/>
+                </a:tc>
+              </a:tr>
+              <a:tr h="370840">
+                <a:tc>
+                  <a:txBody>
+                    <a:bodyPr/>
+                    <a:lstStyle/>
+                    <a:p>
+                      <a:r>
+                        <a:rPr lang="en-US" dirty="0" smtClean="0"/>
+                        <a:t>&gt;=</a:t>
+                      </a:r>
+                      <a:endParaRPr lang="en-US" dirty="0"/>
+                    </a:p>
+                  </a:txBody>
+                  <a:tcPr/>
+                </a:tc>
+                <a:tc>
+                  <a:txBody>
+                    <a:bodyPr/>
+                    <a:lstStyle/>
+                    <a:p>
+                      <a:r>
+                        <a:rPr lang="en-US" dirty="0" smtClean="0"/>
+                        <a:t>Num greater than or equals</a:t>
+                      </a:r>
+                      <a:endParaRPr lang="en-US" dirty="0"/>
+                    </a:p>
+                  </a:txBody>
+                  <a:tcPr/>
+                </a:tc>
+              </a:tr>
+              <a:tr h="370840">
+                <a:tc>
+                  <a:txBody>
+                    <a:bodyPr/>
+                    <a:lstStyle/>
+                    <a:p>
+                      <a:r>
+                        <a:rPr lang="en-US" dirty="0" smtClean="0"/>
+                        <a:t>&lt;</a:t>
+                      </a:r>
+                      <a:endParaRPr lang="en-US" dirty="0"/>
+                    </a:p>
+                  </a:txBody>
+                  <a:tcPr/>
+                </a:tc>
+                <a:tc>
+                  <a:txBody>
+                    <a:bodyPr/>
+                    <a:lstStyle/>
+                    <a:p>
+                      <a:r>
+                        <a:rPr lang="en-US" dirty="0" smtClean="0"/>
+                        <a:t>Num less than</a:t>
+                      </a:r>
+                      <a:endParaRPr lang="en-US" dirty="0"/>
+                    </a:p>
+                  </a:txBody>
+                  <a:tcPr/>
+                </a:tc>
+              </a:tr>
+              <a:tr h="370840">
+                <a:tc>
+                  <a:txBody>
+                    <a:bodyPr/>
+                    <a:lstStyle/>
+                    <a:p>
+                      <a:r>
+                        <a:rPr lang="en-US" dirty="0" smtClean="0"/>
+                        <a:t>&lt;=</a:t>
+                      </a:r>
+                      <a:endParaRPr lang="en-US" dirty="0"/>
+                    </a:p>
+                  </a:txBody>
+                  <a:tcPr/>
+                </a:tc>
+                <a:tc>
+                  <a:txBody>
+                    <a:bodyPr/>
+                    <a:lstStyle/>
+                    <a:p>
+                      <a:r>
+                        <a:rPr lang="en-US" dirty="0" smtClean="0"/>
+                        <a:t>Num less than or equals</a:t>
+                      </a:r>
+                      <a:endParaRPr lang="en-US" dirty="0"/>
+                    </a:p>
+                  </a:txBody>
+                  <a:tcPr/>
+                </a:tc>
+              </a:tr>
+            </a:tbl>
+          </a:graphicData>
+        </a:graphic>
+      </p:graphicFrame>
+      <p:sp>
+        <p:nvSpPr>
+          <p:cNvPr id="8" name="Text Placeholder 7"/>
+          <p:cNvSpPr>
+            <a:spLocks noGrp="1"/>
+          </p:cNvSpPr>
+          <p:nvPr>
+            <p:ph type="body" sz="quarter" idx="3"/>
+          </p:nvPr>
+        </p:nvSpPr>
+        <p:spPr/>
+        <p:txBody>
+          <a:bodyPr/>
+          <a:lstStyle/>
+          <a:p>
+            <a:r>
+              <a:rPr lang="en-US" dirty="0" smtClean="0"/>
+              <a:t>File tests</a:t>
+            </a:r>
+            <a:endParaRPr lang="en-US" dirty="0"/>
+          </a:p>
+        </p:txBody>
+      </p:sp>
+      <p:graphicFrame>
+        <p:nvGraphicFramePr>
+          <p:cNvPr id="11" name="Content Placeholder 10"/>
+          <p:cNvGraphicFramePr>
+            <a:graphicFrameLocks noGrp="1"/>
+          </p:cNvGraphicFramePr>
+          <p:nvPr>
+            <p:ph sz="quarter" idx="4"/>
+          </p:nvPr>
+        </p:nvGraphicFramePr>
+        <p:xfrm>
+          <a:off x="4645025" y="2174875"/>
+          <a:ext cx="4041776" cy="4079240"/>
+        </p:xfrm>
+        <a:graphic>
+          <a:graphicData uri="http://schemas.openxmlformats.org/drawingml/2006/table">
+            <a:tbl>
+              <a:tblPr firstRow="1" bandRow="1">
+                <a:tableStyleId>{21E4AEA4-8DFA-4A89-87EB-49C32662AFE0}</a:tableStyleId>
+              </a:tblPr>
+              <a:tblGrid>
+                <a:gridCol w="1146175"/>
+                <a:gridCol w="2895601"/>
+              </a:tblGrid>
+              <a:tr h="370840">
+                <a:tc>
+                  <a:txBody>
+                    <a:bodyPr/>
+                    <a:lstStyle/>
+                    <a:p>
+                      <a:r>
+                        <a:rPr lang="en-US" dirty="0" smtClean="0"/>
+                        <a:t>Operator</a:t>
+                      </a:r>
+                      <a:endParaRPr lang="en-US" dirty="0"/>
+                    </a:p>
+                  </a:txBody>
+                  <a:tcPr/>
+                </a:tc>
+                <a:tc>
+                  <a:txBody>
+                    <a:bodyPr/>
+                    <a:lstStyle/>
+                    <a:p>
+                      <a:r>
+                        <a:rPr lang="en-US" dirty="0" smtClean="0"/>
+                        <a:t>Meaning</a:t>
+                      </a:r>
+                      <a:endParaRPr lang="en-US" dirty="0"/>
+                    </a:p>
+                  </a:txBody>
+                  <a:tcPr/>
+                </a:tc>
+              </a:tr>
+              <a:tr h="370840">
+                <a:tc>
+                  <a:txBody>
+                    <a:bodyPr/>
+                    <a:lstStyle/>
+                    <a:p>
+                      <a:r>
+                        <a:rPr lang="en-US" dirty="0" smtClean="0"/>
+                        <a:t>-</a:t>
+                      </a:r>
+                      <a:r>
+                        <a:rPr lang="en-US" dirty="0" err="1" smtClean="0"/>
+                        <a:t>e</a:t>
+                      </a:r>
+                      <a:endParaRPr lang="en-US" dirty="0"/>
+                    </a:p>
+                  </a:txBody>
+                  <a:tcPr/>
+                </a:tc>
+                <a:tc>
+                  <a:txBody>
+                    <a:bodyPr/>
+                    <a:lstStyle/>
+                    <a:p>
+                      <a:r>
+                        <a:rPr lang="en-US" dirty="0" smtClean="0"/>
+                        <a:t>File exists</a:t>
+                      </a:r>
+                      <a:endParaRPr lang="en-US" dirty="0"/>
+                    </a:p>
+                  </a:txBody>
+                  <a:tcPr/>
+                </a:tc>
+              </a:tr>
+              <a:tr h="370840">
+                <a:tc>
+                  <a:txBody>
+                    <a:bodyPr/>
+                    <a:lstStyle/>
+                    <a:p>
+                      <a:r>
+                        <a:rPr lang="en-US" dirty="0" smtClean="0"/>
+                        <a:t>-</a:t>
+                      </a:r>
+                      <a:r>
+                        <a:rPr lang="en-US" dirty="0" err="1" smtClean="0"/>
+                        <a:t>f</a:t>
+                      </a:r>
+                      <a:endParaRPr lang="en-US" dirty="0"/>
+                    </a:p>
+                  </a:txBody>
+                  <a:tcPr/>
+                </a:tc>
+                <a:tc>
+                  <a:txBody>
+                    <a:bodyPr/>
+                    <a:lstStyle/>
+                    <a:p>
+                      <a:r>
+                        <a:rPr lang="en-US" dirty="0" smtClean="0"/>
+                        <a:t>File is regular file</a:t>
+                      </a:r>
+                      <a:endParaRPr lang="en-US" dirty="0"/>
+                    </a:p>
+                  </a:txBody>
+                  <a:tcPr/>
+                </a:tc>
+              </a:tr>
+              <a:tr h="370840">
+                <a:tc>
+                  <a:txBody>
+                    <a:bodyPr/>
+                    <a:lstStyle/>
+                    <a:p>
+                      <a:r>
+                        <a:rPr lang="en-US" dirty="0" smtClean="0"/>
+                        <a:t>-</a:t>
+                      </a:r>
+                      <a:r>
+                        <a:rPr lang="en-US" dirty="0" err="1" smtClean="0"/>
+                        <a:t>d</a:t>
+                      </a:r>
+                      <a:endParaRPr lang="en-US" dirty="0"/>
+                    </a:p>
+                  </a:txBody>
+                  <a:tcPr/>
+                </a:tc>
+                <a:tc>
+                  <a:txBody>
+                    <a:bodyPr/>
+                    <a:lstStyle/>
+                    <a:p>
+                      <a:r>
+                        <a:rPr lang="en-US" dirty="0" smtClean="0"/>
+                        <a:t>File is directory</a:t>
+                      </a:r>
+                      <a:endParaRPr lang="en-US" dirty="0"/>
+                    </a:p>
+                  </a:txBody>
+                  <a:tcPr/>
+                </a:tc>
+              </a:tr>
+              <a:tr h="370840">
+                <a:tc>
+                  <a:txBody>
+                    <a:bodyPr/>
+                    <a:lstStyle/>
+                    <a:p>
+                      <a:r>
+                        <a:rPr lang="en-US" dirty="0" smtClean="0"/>
+                        <a:t>-</a:t>
+                      </a:r>
+                      <a:r>
+                        <a:rPr lang="en-US" dirty="0" err="1" smtClean="0"/>
+                        <a:t>r</a:t>
+                      </a:r>
+                      <a:endParaRPr lang="en-US" dirty="0"/>
+                    </a:p>
+                  </a:txBody>
+                  <a:tcPr/>
+                </a:tc>
+                <a:tc>
+                  <a:txBody>
+                    <a:bodyPr/>
+                    <a:lstStyle/>
+                    <a:p>
+                      <a:r>
+                        <a:rPr lang="en-US" dirty="0" smtClean="0"/>
+                        <a:t>File is readable</a:t>
+                      </a:r>
+                      <a:endParaRPr lang="en-US" dirty="0"/>
+                    </a:p>
+                  </a:txBody>
+                  <a:tcPr/>
+                </a:tc>
+              </a:tr>
+              <a:tr h="370840">
+                <a:tc>
+                  <a:txBody>
+                    <a:bodyPr/>
+                    <a:lstStyle/>
+                    <a:p>
+                      <a:r>
+                        <a:rPr lang="en-US" dirty="0" smtClean="0"/>
+                        <a:t>-</a:t>
+                      </a:r>
+                      <a:r>
+                        <a:rPr lang="en-US" dirty="0" err="1" smtClean="0"/>
+                        <a:t>w</a:t>
+                      </a:r>
+                      <a:endParaRPr lang="en-US" dirty="0"/>
+                    </a:p>
+                  </a:txBody>
+                  <a:tcPr/>
+                </a:tc>
+                <a:tc>
+                  <a:txBody>
+                    <a:bodyPr/>
+                    <a:lstStyle/>
+                    <a:p>
+                      <a:r>
+                        <a:rPr lang="en-US" dirty="0" smtClean="0"/>
+                        <a:t>File is writable</a:t>
+                      </a:r>
+                      <a:endParaRPr lang="en-US" dirty="0"/>
+                    </a:p>
+                  </a:txBody>
+                  <a:tcPr/>
+                </a:tc>
+              </a:tr>
+              <a:tr h="370840">
+                <a:tc>
+                  <a:txBody>
+                    <a:bodyPr/>
+                    <a:lstStyle/>
+                    <a:p>
+                      <a:r>
+                        <a:rPr lang="en-US" dirty="0" smtClean="0"/>
+                        <a:t>-</a:t>
+                      </a:r>
+                      <a:r>
+                        <a:rPr lang="en-US" dirty="0" err="1" smtClean="0"/>
+                        <a:t>x</a:t>
+                      </a:r>
+                      <a:endParaRPr lang="en-US" dirty="0"/>
+                    </a:p>
+                  </a:txBody>
+                  <a:tcPr/>
+                </a:tc>
+                <a:tc>
+                  <a:txBody>
+                    <a:bodyPr/>
+                    <a:lstStyle/>
+                    <a:p>
+                      <a:r>
+                        <a:rPr lang="en-US" dirty="0" smtClean="0"/>
+                        <a:t>File is executable</a:t>
+                      </a:r>
+                      <a:endParaRPr lang="en-US" dirty="0"/>
+                    </a:p>
+                  </a:txBody>
+                  <a:tcPr/>
+                </a:tc>
+              </a:tr>
+              <a:tr h="370840">
+                <a:tc>
+                  <a:txBody>
+                    <a:bodyPr/>
+                    <a:lstStyle/>
+                    <a:p>
+                      <a:r>
+                        <a:rPr lang="en-US" dirty="0" smtClean="0"/>
+                        <a:t>-</a:t>
+                      </a:r>
+                      <a:r>
+                        <a:rPr lang="en-US" dirty="0" err="1" smtClean="0"/>
+                        <a:t>s</a:t>
+                      </a:r>
+                      <a:endParaRPr lang="en-US" dirty="0"/>
+                    </a:p>
+                  </a:txBody>
+                  <a:tcPr/>
+                </a:tc>
+                <a:tc>
+                  <a:txBody>
+                    <a:bodyPr/>
+                    <a:lstStyle/>
+                    <a:p>
+                      <a:r>
+                        <a:rPr lang="en-US" dirty="0" smtClean="0"/>
+                        <a:t>File is not zero size</a:t>
+                      </a:r>
+                      <a:endParaRPr lang="en-US" dirty="0"/>
+                    </a:p>
+                  </a:txBody>
+                  <a:tcPr/>
+                </a:tc>
+              </a:tr>
+              <a:tr h="370840">
+                <a:tc>
+                  <a:txBody>
+                    <a:bodyPr/>
+                    <a:lstStyle/>
+                    <a:p>
+                      <a:r>
+                        <a:rPr lang="en-US" dirty="0" smtClean="0"/>
+                        <a:t>-N</a:t>
+                      </a:r>
+                      <a:endParaRPr lang="en-US" dirty="0"/>
+                    </a:p>
+                  </a:txBody>
+                  <a:tcPr/>
+                </a:tc>
+                <a:tc>
+                  <a:txBody>
+                    <a:bodyPr/>
+                    <a:lstStyle/>
+                    <a:p>
+                      <a:r>
+                        <a:rPr lang="en-US" dirty="0" smtClean="0"/>
+                        <a:t>File modified since last read</a:t>
+                      </a:r>
+                      <a:endParaRPr lang="en-US" dirty="0"/>
+                    </a:p>
+                  </a:txBody>
+                  <a:tcPr/>
+                </a:tc>
+              </a:tr>
+              <a:tr h="370840">
+                <a:tc>
+                  <a:txBody>
+                    <a:bodyPr/>
+                    <a:lstStyle/>
+                    <a:p>
+                      <a:r>
+                        <a:rPr lang="en-US" dirty="0" smtClean="0"/>
+                        <a:t>-O</a:t>
+                      </a:r>
+                      <a:endParaRPr lang="en-US" dirty="0"/>
+                    </a:p>
+                  </a:txBody>
+                  <a:tcPr/>
+                </a:tc>
+                <a:tc>
+                  <a:txBody>
+                    <a:bodyPr/>
+                    <a:lstStyle/>
+                    <a:p>
+                      <a:r>
+                        <a:rPr lang="en-US" dirty="0" smtClean="0"/>
+                        <a:t>You own the file</a:t>
+                      </a:r>
+                      <a:endParaRPr lang="en-US" dirty="0"/>
+                    </a:p>
+                  </a:txBody>
+                  <a:tcPr/>
+                </a:tc>
+              </a:tr>
+              <a:tr h="370840">
+                <a:tc>
+                  <a:txBody>
+                    <a:bodyPr/>
+                    <a:lstStyle/>
+                    <a:p>
+                      <a:r>
+                        <a:rPr lang="en-US" dirty="0" smtClean="0"/>
+                        <a:t>-G</a:t>
+                      </a:r>
+                      <a:endParaRPr lang="en-US" dirty="0"/>
+                    </a:p>
+                  </a:txBody>
+                  <a:tcPr/>
+                </a:tc>
+                <a:tc>
+                  <a:txBody>
+                    <a:bodyPr/>
+                    <a:lstStyle/>
+                    <a:p>
+                      <a:r>
+                        <a:rPr lang="en-US" dirty="0" smtClean="0"/>
+                        <a:t>Group ID is same</a:t>
+                      </a:r>
+                      <a:r>
+                        <a:rPr lang="en-US" baseline="0" dirty="0" smtClean="0"/>
+                        <a:t> as yours</a:t>
+                      </a:r>
+                      <a:endParaRPr lang="en-US" dirty="0"/>
+                    </a:p>
+                  </a:txBody>
+                  <a:tcPr/>
+                </a:tc>
+              </a:tr>
+            </a:tbl>
+          </a:graphicData>
+        </a:graphic>
+      </p:graphicFrame>
+    </p:spTree>
+  </p:cSld>
+  <p:clrMapOvr>
+    <a:masterClrMapping/>
+  </p:clrMapOvr>
+</p:sld>
+</file>
+
+<file path=ppt/slides/slide16.xml><?xml version="1.0" encoding="utf-8"?>
+<p:sld xmlns:a="http://schemas.openxmlformats.org/drawingml/2006/main" xmlns:r="http://schemas.openxmlformats.org/officeDocument/2006/relationships" xmlns:mc="http://schemas.openxmlformats.org/markup-compatibility/2006" xmlns:mv="urn:schemas-microsoft-com:mac:vml" xmlns:p="http://schemas.openxmlformats.org/presentationml/2006/main" mc:Ignorable="mv" mc:PreserveAttributes="mv:*">
+  <p:cSld>
+    <p:spTree>
+      <p:nvGrpSpPr>
+        <p:cNvPr id="1" name=""/>
+        <p:cNvGrpSpPr/>
+        <p:nvPr/>
+      </p:nvGrpSpPr>
+      <p:grpSpPr>
+        <a:xfrm>
+          <a:off x="0" y="0"/>
+          <a:ext cx="0" cy="0"/>
+          <a:chOff x="0" y="0"/>
+          <a:chExt cx="0" cy="0"/>
+        </a:xfrm>
+      </p:grpSpPr>
+      <p:sp>
+        <p:nvSpPr>
+          <p:cNvPr id="2" name="Title 1"/>
+          <p:cNvSpPr>
+            <a:spLocks noGrp="1"/>
+          </p:cNvSpPr>
+          <p:nvPr>
+            <p:ph type="title"/>
+          </p:nvPr>
+        </p:nvSpPr>
+        <p:spPr/>
+        <p:txBody>
+          <a:bodyPr/>
+          <a:lstStyle/>
+          <a:p>
+            <a:r>
+              <a:rPr lang="en-US" dirty="0" smtClean="0"/>
               <a:t>Exercise: a simple shell script</a:t>
             </a:r>
             <a:endParaRPr lang="en-US" dirty="0"/>
@@ -3925,7 +5447,23 @@
           <a:bodyPr/>
           <a:lstStyle/>
           <a:p>
-            <a:endParaRPr lang="en-US"/>
+            <a:r>
+              <a:rPr lang="en-US" dirty="0" smtClean="0"/>
+              <a:t>Write a simple shell script that tests all FASTQ files in the </a:t>
+            </a:r>
+            <a:r>
+              <a:rPr lang="en-US" dirty="0" smtClean="0"/>
+              <a:t>data/</a:t>
+            </a:r>
+            <a:r>
+              <a:rPr lang="en-US" dirty="0" err="1" smtClean="0"/>
+              <a:t>fastq</a:t>
+            </a:r>
+            <a:r>
+              <a:rPr lang="en-US" dirty="0" smtClean="0"/>
+              <a:t> folder, print out the names of invalid files.</a:t>
+            </a:r>
+            <a:endParaRPr lang="en-US" dirty="0"/>
           </a:p>
         </p:txBody>
       </p:sp>
@@ -3971,7 +5509,15 @@
           <a:p>
             <a:r>
               <a:rPr lang="en-US" dirty="0" smtClean="0"/>
-              <a:t>Procedural programming</a:t>
+              <a:t>The </a:t>
+            </a:r>
+            <a:r>
+              <a:rPr lang="en-US" dirty="0" smtClean="0"/>
+              <a:t>command line s</a:t>
+            </a:r>
+            <a:r>
+              <a:rPr lang="en-US" dirty="0" smtClean="0"/>
+              <a:t>hell</a:t>
             </a:r>
             <a:endParaRPr lang="en-US" dirty="0"/>
           </a:p>
@@ -3992,7 +5538,39 @@
           <a:bodyPr/>
           <a:lstStyle/>
           <a:p>
-            <a:endParaRPr lang="en-US"/>
+            <a:r>
+              <a:rPr lang="en-US" dirty="0" smtClean="0"/>
+              <a:t>The command line (or console, shell, terminal) is a text-based interface to the operating syste</a:t>
+            </a:r>
+            <a:r>
+              <a:rPr lang="en-US" dirty="0" smtClean="0"/>
+              <a:t>m.</a:t>
+            </a:r>
+          </a:p>
+          <a:p>
+            <a:r>
+              <a:rPr lang="en-US" dirty="0" smtClean="0"/>
+              <a:t>Instead of typing shell commands one by one, we can put them in a text file and </a:t>
+            </a:r>
+            <a:r>
+              <a:rPr lang="en-US" dirty="0" smtClean="0"/>
+              <a:t>execute that.</a:t>
+            </a:r>
+          </a:p>
+          <a:p>
+            <a:r>
+              <a:rPr lang="en-US" dirty="0" smtClean="0"/>
+              <a:t>This is called </a:t>
+            </a:r>
+            <a:r>
+              <a:rPr lang="en-US" i="1" dirty="0" smtClean="0"/>
+              <a:t>scripting</a:t>
+            </a:r>
+            <a:r>
+              <a:rPr lang="en-US" dirty="0" smtClean="0"/>
+              <a:t>.</a:t>
+            </a:r>
+            <a:endParaRPr lang="en-US" dirty="0"/>
           </a:p>
         </p:txBody>
       </p:sp>
@@ -4001,6 +5579,13 @@
   <p:clrMapOvr>
     <a:masterClrMapping/>
   </p:clrMapOvr>
+  <p:timing>
+    <p:tnLst>
+      <p:par>
+        <p:cTn id="1" dur="indefinite" restart="never" nodeType="tmRoot"/>
+      </p:par>
+    </p:tnLst>
+  </p:timing>
 </p:sld>
 </file>
 
@@ -4038,7 +5623,11 @@
           <a:p>
             <a:r>
               <a:rPr lang="en-US" dirty="0" smtClean="0"/>
-              <a:t>Interpreted languages</a:t>
+              <a:t>Interpreted</a:t>
+            </a:r>
+            <a:r>
+              <a:rPr lang="en-US" dirty="0" smtClean="0"/>
+              <a:t> (“scripting”) languages</a:t>
             </a:r>
             <a:endParaRPr lang="en-US" dirty="0"/>
           </a:p>
@@ -4056,10 +5645,63 @@
         </p:nvSpPr>
         <p:spPr/>
         <p:txBody>
-          <a:bodyPr/>
-          <a:lstStyle/>
-          <a:p>
-            <a:endParaRPr lang="en-US"/>
+          <a:bodyPr>
+            <a:normAutofit fontScale="92500" lnSpcReduction="10000"/>
+          </a:bodyPr>
+          <a:lstStyle/>
+          <a:p>
+            <a:r>
+              <a:rPr lang="en-US" dirty="0" smtClean="0"/>
+              <a:t>When we program the UNIX shell, the program </a:t>
+            </a:r>
+            <a:r>
+              <a:rPr lang="en-US" dirty="0" smtClean="0"/>
+              <a:t>is a re-run of commands that we could also type and execute one-by-one in a terminal window*. </a:t>
+            </a:r>
+          </a:p>
+          <a:p>
+            <a:r>
+              <a:rPr lang="en-US" dirty="0" smtClean="0"/>
+              <a:t>Other environments can be scripted in a similar way, for example:</a:t>
+            </a:r>
+          </a:p>
+          <a:p>
+            <a:pPr lvl="1"/>
+            <a:r>
+              <a:rPr lang="en-US" dirty="0" smtClean="0"/>
+              <a:t>Perl</a:t>
+            </a:r>
+          </a:p>
+          <a:p>
+            <a:pPr lvl="1"/>
+            <a:r>
+              <a:rPr lang="en-US" dirty="0" smtClean="0"/>
+              <a:t>Python</a:t>
+            </a:r>
+          </a:p>
+          <a:p>
+            <a:pPr lvl="1"/>
+            <a:r>
+              <a:rPr lang="en-US" dirty="0" smtClean="0"/>
+              <a:t>Ruby</a:t>
+            </a:r>
+          </a:p>
+          <a:p>
+            <a:pPr lvl="1"/>
+            <a:r>
+              <a:rPr lang="en-US" dirty="0" smtClean="0"/>
+              <a:t>R</a:t>
+            </a:r>
+          </a:p>
+          <a:p>
+            <a:pPr>
+              <a:buNone/>
+            </a:pPr>
+            <a:r>
+              <a:rPr lang="en-US" sz="2595" i="1" dirty="0" smtClean="0"/>
+              <a:t>* plus extra syntax sugar!</a:t>
+            </a:r>
+            <a:endParaRPr lang="en-US" sz="2595" i="1" dirty="0"/>
           </a:p>
         </p:txBody>
       </p:sp>
@@ -4068,6 +5710,13 @@
   <p:clrMapOvr>
     <a:masterClrMapping/>
   </p:clrMapOvr>
+  <p:timing>
+    <p:tnLst>
+      <p:par>
+        <p:cTn id="1" dur="indefinite" restart="never" nodeType="tmRoot"/>
+      </p:par>
+    </p:tnLst>
+  </p:timing>
 </p:sld>
 </file>
 
@@ -4105,7 +5754,7 @@
           <a:p>
             <a:r>
               <a:rPr lang="en-US" dirty="0" smtClean="0"/>
-              <a:t>Shells</a:t>
+              <a:t>Imperative programming</a:t>
             </a:r>
             <a:endParaRPr lang="en-US" dirty="0"/>
           </a:p>
@@ -4123,35 +5772,31 @@
         </p:nvSpPr>
         <p:spPr/>
         <p:txBody>
-          <a:bodyPr/>
-          <a:lstStyle/>
-          <a:p>
-            <a:r>
-              <a:rPr lang="en-US" dirty="0" smtClean="0"/>
-              <a:t>$SHELL</a:t>
-            </a:r>
-          </a:p>
-          <a:p>
-            <a:r>
-              <a:rPr lang="en-US" dirty="0" smtClean="0"/>
-              <a:t>bash</a:t>
-            </a:r>
-          </a:p>
-          <a:p>
-            <a:r>
-              <a:rPr lang="en-US" dirty="0" err="1" smtClean="0"/>
-              <a:t>csh</a:t>
-            </a:r>
-            <a:endParaRPr lang="en-US" dirty="0" smtClean="0"/>
-          </a:p>
-          <a:p>
-            <a:r>
-              <a:rPr lang="en-US" dirty="0" err="1" smtClean="0"/>
-              <a:t>ksh</a:t>
-            </a:r>
-            <a:endParaRPr lang="en-US" dirty="0" smtClean="0"/>
-          </a:p>
-          <a:p>
+          <a:bodyPr>
+            <a:normAutofit/>
+          </a:bodyPr>
+          <a:lstStyle/>
+          <a:p>
+            <a:r>
+              <a:rPr lang="en-US" dirty="0" smtClean="0"/>
+              <a:t>There are different </a:t>
+            </a:r>
+            <a:r>
+              <a:rPr lang="en-US" dirty="0" smtClean="0"/>
+              <a:t>ways to organize the instructions in source code.</a:t>
+            </a:r>
+          </a:p>
+          <a:p>
+            <a:r>
+              <a:rPr lang="en-US" dirty="0" smtClean="0"/>
+              <a:t>The most intuitive way is simply by having all instruction be executed linearly, from top to bottom, i.e. “procedural” or “imperative” programming.</a:t>
+            </a:r>
+          </a:p>
+          <a:p>
+            <a:r>
+              <a:rPr lang="en-US" dirty="0" smtClean="0"/>
+              <a:t>UNIX shell programming is by-and-large imperative programming.</a:t>
+            </a:r>
             <a:endParaRPr lang="en-US" dirty="0"/>
           </a:p>
         </p:txBody>
@@ -4161,6 +5806,13 @@
   <p:clrMapOvr>
     <a:masterClrMapping/>
   </p:clrMapOvr>
+  <p:timing>
+    <p:tnLst>
+      <p:par>
+        <p:cTn id="1" dur="indefinite" restart="never" nodeType="tmRoot"/>
+      </p:par>
+    </p:tnLst>
+  </p:timing>
 </p:sld>
 </file>
 
@@ -4193,12 +5845,14 @@
         </p:nvSpPr>
         <p:spPr/>
         <p:txBody>
-          <a:bodyPr/>
-          <a:lstStyle/>
-          <a:p>
-            <a:r>
-              <a:rPr lang="en-US" dirty="0" smtClean="0"/>
-              <a:t>Shebang line</a:t>
+          <a:bodyPr>
+            <a:normAutofit fontScale="90000"/>
+          </a:bodyPr>
+          <a:lstStyle/>
+          <a:p>
+            <a:r>
+              <a:rPr lang="en-US" dirty="0" smtClean="0"/>
+              <a:t>Why bother learning shell scripting?</a:t>
             </a:r>
             <a:endParaRPr lang="en-US" dirty="0"/>
           </a:p>
@@ -4219,7 +5873,23 @@
           <a:bodyPr/>
           <a:lstStyle/>
           <a:p>
-            <a:endParaRPr lang="en-US"/>
+            <a:r>
+              <a:rPr lang="en-US" dirty="0" smtClean="0"/>
+              <a:t>Shell scripting is often the lowest common denominator, useful for simple tasks all team members need to understand or build upon.</a:t>
+            </a:r>
+          </a:p>
+          <a:p>
+            <a:r>
+              <a:rPr lang="en-US" dirty="0" smtClean="0"/>
+              <a:t>Shell scripting constructs (e.g. looping over a set of files) are too useful not to know when working on the command line.</a:t>
+            </a:r>
+          </a:p>
+          <a:p>
+            <a:r>
+              <a:rPr lang="en-US" dirty="0" smtClean="0"/>
+              <a:t>The shell is always there, even if other tools are not.</a:t>
+            </a:r>
+            <a:endParaRPr lang="en-US" dirty="0"/>
           </a:p>
         </p:txBody>
       </p:sp>
@@ -4228,6 +5898,13 @@
   <p:clrMapOvr>
     <a:masterClrMapping/>
   </p:clrMapOvr>
+  <p:timing>
+    <p:tnLst>
+      <p:par>
+        <p:cTn id="1" dur="indefinite" restart="never" nodeType="tmRoot"/>
+      </p:par>
+    </p:tnLst>
+  </p:timing>
 </p:sld>
 </file>
 
@@ -4265,7 +5942,7 @@
           <a:p>
             <a:r>
               <a:rPr lang="en-US" dirty="0" smtClean="0"/>
-              <a:t>Statements</a:t>
+              <a:t>Executing a script</a:t>
             </a:r>
             <a:endParaRPr lang="en-US" dirty="0"/>
           </a:p>
@@ -4283,10 +5960,164 @@
         </p:nvSpPr>
         <p:spPr/>
         <p:txBody>
-          <a:bodyPr/>
-          <a:lstStyle/>
-          <a:p>
-            <a:endParaRPr lang="en-US"/>
+          <a:bodyPr>
+            <a:normAutofit lnSpcReduction="10000"/>
+          </a:bodyPr>
+          <a:lstStyle/>
+          <a:p>
+            <a:r>
+              <a:rPr lang="en-US" dirty="0" smtClean="0"/>
+              <a:t>Scripts can be executed by invoking the interpreter followed by the script name:</a:t>
+            </a:r>
+            <a:br>
+              <a:rPr lang="en-US" dirty="0" smtClean="0"/>
+            </a:br>
+            <a:r>
+              <a:rPr lang="en-US" dirty="0" smtClean="0">
+                <a:latin typeface="Courier New"/>
+                <a:cs typeface="Courier New"/>
+              </a:rPr>
+              <a:t>$ </a:t>
+            </a:r>
+            <a:r>
+              <a:rPr lang="en-US" dirty="0" err="1" smtClean="0">
+                <a:latin typeface="Courier New"/>
+                <a:cs typeface="Courier New"/>
+              </a:rPr>
+              <a:t>sh</a:t>
+            </a:r>
+            <a:r>
+              <a:rPr lang="en-US" dirty="0" smtClean="0">
+                <a:latin typeface="Courier New"/>
+                <a:cs typeface="Courier New"/>
+              </a:rPr>
+              <a:t> </a:t>
+            </a:r>
+            <a:r>
+              <a:rPr lang="en-US" dirty="0" err="1" smtClean="0">
+                <a:latin typeface="Courier New"/>
+                <a:cs typeface="Courier New"/>
+              </a:rPr>
+              <a:t>myscript.sh</a:t>
+            </a:r>
+            <a:endParaRPr lang="en-US" dirty="0" smtClean="0">
+              <a:latin typeface="Courier New"/>
+              <a:cs typeface="Courier New"/>
+            </a:endParaRPr>
+          </a:p>
+          <a:p>
+            <a:r>
+              <a:rPr lang="en-US" dirty="0" smtClean="0"/>
+              <a:t>Scripts can also be made executable so they behave like any other program:</a:t>
+            </a:r>
+            <a:br>
+              <a:rPr lang="en-US" dirty="0" smtClean="0"/>
+            </a:br>
+            <a:r>
+              <a:rPr lang="en-US" dirty="0" smtClean="0">
+                <a:latin typeface="Courier New"/>
+                <a:cs typeface="Courier New"/>
+              </a:rPr>
+              <a:t>$ </a:t>
+            </a:r>
+            <a:r>
+              <a:rPr lang="en-US" dirty="0" err="1" smtClean="0">
+                <a:latin typeface="Courier New"/>
+                <a:cs typeface="Courier New"/>
+              </a:rPr>
+              <a:t>chmod</a:t>
+            </a:r>
+            <a:r>
+              <a:rPr lang="en-US" dirty="0" smtClean="0">
+                <a:latin typeface="Courier New"/>
+                <a:cs typeface="Courier New"/>
+              </a:rPr>
+              <a:t> </a:t>
+            </a:r>
+            <a:r>
+              <a:rPr lang="en-US" dirty="0" err="1" smtClean="0">
+                <a:latin typeface="Courier New"/>
+                <a:cs typeface="Courier New"/>
+              </a:rPr>
+              <a:t>u</a:t>
+            </a:r>
+            <a:r>
+              <a:rPr lang="en-US" dirty="0" smtClean="0">
+                <a:latin typeface="Courier New"/>
+                <a:cs typeface="Courier New"/>
+              </a:rPr>
+              <a:t>=+</a:t>
+            </a:r>
+            <a:r>
+              <a:rPr lang="en-US" dirty="0" err="1" smtClean="0">
+                <a:latin typeface="Courier New"/>
+                <a:cs typeface="Courier New"/>
+              </a:rPr>
+              <a:t>x</a:t>
+            </a:r>
+            <a:r>
+              <a:rPr lang="en-US" dirty="0" smtClean="0">
+                <a:latin typeface="Courier New"/>
+                <a:cs typeface="Courier New"/>
+              </a:rPr>
+              <a:t> </a:t>
+            </a:r>
+            <a:r>
+              <a:rPr lang="en-US" dirty="0" err="1" smtClean="0">
+                <a:latin typeface="Courier New"/>
+                <a:cs typeface="Courier New"/>
+              </a:rPr>
+              <a:t>myscript.sh</a:t>
+            </a:r>
+            <a:r>
+              <a:rPr lang="en-US" dirty="0" smtClean="0">
+                <a:latin typeface="Courier New"/>
+                <a:cs typeface="Courier New"/>
+              </a:rPr>
+              <a:t/>
+            </a:r>
+            <a:br>
+              <a:rPr lang="en-US" dirty="0" smtClean="0">
+                <a:latin typeface="Courier New"/>
+                <a:cs typeface="Courier New"/>
+              </a:rPr>
+            </a:br>
+            <a:r>
+              <a:rPr lang="en-US" dirty="0" smtClean="0">
+                <a:latin typeface="Courier New"/>
+                <a:cs typeface="Courier New"/>
+              </a:rPr>
+              <a:t>$ .</a:t>
+            </a:r>
+            <a:r>
+              <a:rPr lang="en-US" dirty="0" smtClean="0">
+                <a:latin typeface="Courier New"/>
+                <a:cs typeface="Courier New"/>
+              </a:rPr>
+              <a:t>/</a:t>
+            </a:r>
+            <a:r>
+              <a:rPr lang="en-US" dirty="0" err="1" smtClean="0">
+                <a:latin typeface="Courier New"/>
+                <a:cs typeface="Courier New"/>
+              </a:rPr>
+              <a:t>myscript.sh</a:t>
+            </a:r>
+            <a:endParaRPr lang="en-US" dirty="0" smtClean="0">
+              <a:latin typeface="Courier New"/>
+              <a:cs typeface="Courier New"/>
+            </a:endParaRPr>
+          </a:p>
+          <a:p>
+            <a:r>
+              <a:rPr lang="en-US" dirty="0" smtClean="0">
+                <a:cs typeface="Courier New"/>
+              </a:rPr>
+              <a:t>But how does the operating system know how to execute the script?</a:t>
+            </a:r>
+            <a:endParaRPr lang="en-US" dirty="0">
+              <a:cs typeface="Courier New"/>
+            </a:endParaRPr>
           </a:p>
         </p:txBody>
       </p:sp>
@@ -4295,6 +6126,13 @@
   <p:clrMapOvr>
     <a:masterClrMapping/>
   </p:clrMapOvr>
+  <p:timing>
+    <p:tnLst>
+      <p:par>
+        <p:cTn id="1" dur="indefinite" restart="never" nodeType="tmRoot"/>
+      </p:par>
+    </p:tnLst>
+  </p:timing>
 </p:sld>
 </file>
 
@@ -4332,7 +6170,7 @@
           <a:p>
             <a:r>
               <a:rPr lang="en-US" dirty="0" smtClean="0"/>
-              <a:t>Variables</a:t>
+              <a:t>Shebang line</a:t>
             </a:r>
             <a:endParaRPr lang="en-US" dirty="0"/>
           </a:p>
@@ -4350,10 +6188,135 @@
         </p:nvSpPr>
         <p:spPr/>
         <p:txBody>
-          <a:bodyPr/>
-          <a:lstStyle/>
-          <a:p>
-            <a:endParaRPr lang="en-US"/>
+          <a:bodyPr>
+            <a:normAutofit/>
+          </a:bodyPr>
+          <a:lstStyle/>
+          <a:p>
+            <a:r>
+              <a:rPr lang="en-US" dirty="0" smtClean="0"/>
+              <a:t>Many scripts start with the </a:t>
+            </a:r>
+            <a:r>
+              <a:rPr lang="en-US" dirty="0" smtClean="0"/>
+              <a:t>magic characters </a:t>
+            </a:r>
+            <a:r>
+              <a:rPr lang="en-US" dirty="0" smtClean="0">
+                <a:latin typeface="Courier New"/>
+                <a:cs typeface="Courier New"/>
+              </a:rPr>
+              <a:t>#! </a:t>
+            </a:r>
+            <a:r>
+              <a:rPr lang="en-US" dirty="0" smtClean="0"/>
+              <a:t>and the path to an interpreter, e.g.:</a:t>
+            </a:r>
+            <a:br>
+              <a:rPr lang="en-US" dirty="0" smtClean="0"/>
+            </a:br>
+            <a:r>
+              <a:rPr lang="en-US" dirty="0" smtClean="0">
+                <a:latin typeface="Courier New"/>
+                <a:cs typeface="Courier New"/>
+              </a:rPr>
+              <a:t>#!/bin/</a:t>
+            </a:r>
+            <a:r>
+              <a:rPr lang="en-US" dirty="0" err="1" smtClean="0">
+                <a:latin typeface="Courier New"/>
+                <a:cs typeface="Courier New"/>
+              </a:rPr>
+              <a:t>sh</a:t>
+            </a:r>
+            <a:endParaRPr lang="en-US" dirty="0" smtClean="0">
+              <a:latin typeface="Courier New"/>
+              <a:cs typeface="Courier New"/>
+            </a:endParaRPr>
+          </a:p>
+          <a:p>
+            <a:r>
+              <a:rPr lang="en-US" dirty="0" smtClean="0">
+                <a:cs typeface="Courier New"/>
+              </a:rPr>
+              <a:t>When such a script is executed, the operating system will pass the script to the interpreter </a:t>
+            </a:r>
+            <a:r>
+              <a:rPr lang="en-US" dirty="0" smtClean="0">
+                <a:cs typeface="Courier New"/>
+              </a:rPr>
+              <a:t>in the shebang, i.e.:</a:t>
+            </a:r>
+            <a:br>
+              <a:rPr lang="en-US" dirty="0" smtClean="0">
+                <a:cs typeface="Courier New"/>
+              </a:rPr>
+            </a:br>
+            <a:r>
+              <a:rPr lang="en-US" sz="2400" dirty="0" smtClean="0">
+                <a:latin typeface="Courier New"/>
+                <a:cs typeface="Courier New"/>
+              </a:rPr>
+              <a:t>./</a:t>
+            </a:r>
+            <a:r>
+              <a:rPr lang="en-US" sz="2400" dirty="0" err="1" smtClean="0">
+                <a:latin typeface="Courier New"/>
+                <a:cs typeface="Courier New"/>
+              </a:rPr>
+              <a:t>myscript.sh</a:t>
+            </a:r>
+            <a:r>
+              <a:rPr lang="en-US" sz="2400" dirty="0" smtClean="0">
+                <a:latin typeface="Courier New"/>
+                <a:cs typeface="Courier New"/>
+              </a:rPr>
+              <a:t> </a:t>
+            </a:r>
+            <a:r>
+              <a:rPr lang="en-US" dirty="0" smtClean="0">
+                <a:cs typeface="Courier New"/>
+              </a:rPr>
+              <a:t>becomes</a:t>
+            </a:r>
+            <a:r>
+              <a:rPr lang="en-US" dirty="0" smtClean="0">
+                <a:cs typeface="Courier New"/>
+              </a:rPr>
+              <a:t> </a:t>
+            </a:r>
+            <a:r>
+              <a:rPr lang="en-US" sz="2400" dirty="0" smtClean="0">
+                <a:latin typeface="Courier New"/>
+                <a:cs typeface="Courier New"/>
+              </a:rPr>
+              <a:t>/bin/</a:t>
+            </a:r>
+            <a:r>
+              <a:rPr lang="en-US" sz="2400" dirty="0" err="1" smtClean="0">
+                <a:latin typeface="Courier New"/>
+                <a:cs typeface="Courier New"/>
+              </a:rPr>
+              <a:t>sh</a:t>
+            </a:r>
+            <a:r>
+              <a:rPr lang="en-US" sz="2400" dirty="0" smtClean="0">
+                <a:latin typeface="Courier New"/>
+                <a:cs typeface="Courier New"/>
+              </a:rPr>
+              <a:t> </a:t>
+            </a:r>
+            <a:r>
+              <a:rPr lang="en-US" sz="2400" dirty="0" err="1" smtClean="0">
+                <a:latin typeface="Courier New"/>
+                <a:cs typeface="Courier New"/>
+              </a:rPr>
+              <a:t>myscript.sh</a:t>
+            </a:r>
+            <a:endParaRPr lang="en-US" dirty="0">
+              <a:latin typeface="Courier New"/>
+              <a:cs typeface="Courier New"/>
+            </a:endParaRPr>
           </a:p>
         </p:txBody>
       </p:sp>
@@ -4362,6 +6325,13 @@
   <p:clrMapOvr>
     <a:masterClrMapping/>
   </p:clrMapOvr>
+  <p:timing>
+    <p:tnLst>
+      <p:par>
+        <p:cTn id="1" dur="indefinite" restart="never" nodeType="tmRoot"/>
+      </p:par>
+    </p:tnLst>
+  </p:timing>
 </p:sld>
 </file>
 
@@ -4399,7 +6369,7 @@
           <a:p>
             <a:r>
               <a:rPr lang="en-US" dirty="0" smtClean="0"/>
-              <a:t>Loops and branches</a:t>
+              <a:t>Example</a:t>
             </a:r>
             <a:endParaRPr lang="en-US" dirty="0"/>
           </a:p>
@@ -4417,10 +6387,216 @@
         </p:nvSpPr>
         <p:spPr/>
         <p:txBody>
-          <a:bodyPr/>
-          <a:lstStyle/>
-          <a:p>
-            <a:endParaRPr lang="en-US"/>
+          <a:bodyPr>
+            <a:normAutofit/>
+          </a:bodyPr>
+          <a:lstStyle/>
+          <a:p>
+            <a:pPr marL="0" indent="0">
+              <a:buNone/>
+            </a:pPr>
+            <a:r>
+              <a:rPr lang="en-US" dirty="0" smtClean="0"/>
+              <a:t>The following example creates a simple shell script called '</a:t>
+            </a:r>
+            <a:r>
+              <a:rPr lang="en-US" dirty="0" err="1" smtClean="0"/>
+              <a:t>myscript.sh</a:t>
+            </a:r>
+            <a:r>
+              <a:rPr lang="en-US" dirty="0" smtClean="0"/>
+              <a:t>', makes it executable and runs it:</a:t>
+            </a:r>
+          </a:p>
+          <a:p>
+            <a:pPr>
+              <a:buFont typeface="Lucida Grande"/>
+              <a:buChar char="$"/>
+            </a:pPr>
+            <a:r>
+              <a:rPr lang="en-US" sz="2400" dirty="0" smtClean="0">
+                <a:latin typeface="Courier New"/>
+                <a:cs typeface="Courier New"/>
+              </a:rPr>
+              <a:t>echo '#!/bin/</a:t>
+            </a:r>
+            <a:r>
+              <a:rPr lang="en-US" sz="2400" dirty="0" err="1" smtClean="0">
+                <a:latin typeface="Courier New"/>
+                <a:cs typeface="Courier New"/>
+              </a:rPr>
+              <a:t>sh</a:t>
+            </a:r>
+            <a:r>
+              <a:rPr lang="en-US" sz="2400" dirty="0" smtClean="0">
+                <a:latin typeface="Courier New"/>
+                <a:cs typeface="Courier New"/>
+              </a:rPr>
+              <a:t>' &gt; </a:t>
+            </a:r>
+            <a:r>
+              <a:rPr lang="en-US" sz="2400" dirty="0" err="1" smtClean="0">
+                <a:latin typeface="Courier New"/>
+                <a:cs typeface="Courier New"/>
+              </a:rPr>
+              <a:t>myscript.sh</a:t>
+            </a:r>
+            <a:endParaRPr lang="en-US" sz="2400" dirty="0" smtClean="0">
+              <a:latin typeface="Courier New"/>
+              <a:cs typeface="Courier New"/>
+            </a:endParaRPr>
+          </a:p>
+          <a:p>
+            <a:pPr>
+              <a:buFont typeface="Lucida Grande"/>
+              <a:buChar char="$"/>
+            </a:pPr>
+            <a:r>
+              <a:rPr lang="en-US" sz="2400" dirty="0" smtClean="0">
+                <a:latin typeface="Courier New"/>
+                <a:cs typeface="Courier New"/>
+              </a:rPr>
+              <a:t>echo</a:t>
+            </a:r>
+            <a:r>
+              <a:rPr lang="en-US" sz="2400" dirty="0" smtClean="0">
+                <a:latin typeface="Courier New"/>
+                <a:cs typeface="Courier New"/>
+              </a:rPr>
+              <a:t> 'echo "Hello World!"' &gt;&gt; </a:t>
+            </a:r>
+            <a:r>
+              <a:rPr lang="en-US" sz="2400" dirty="0" err="1" smtClean="0">
+                <a:latin typeface="Courier New"/>
+                <a:cs typeface="Courier New"/>
+              </a:rPr>
+              <a:t>myscript.sh</a:t>
+            </a:r>
+            <a:endParaRPr lang="en-US" sz="2400" dirty="0" smtClean="0">
+              <a:latin typeface="Courier New"/>
+              <a:cs typeface="Courier New"/>
+            </a:endParaRPr>
+          </a:p>
+          <a:p>
+            <a:pPr>
+              <a:buFont typeface="Lucida Grande"/>
+              <a:buChar char="$"/>
+            </a:pPr>
+            <a:r>
+              <a:rPr lang="en-US" sz="2400" dirty="0" smtClean="0">
+                <a:latin typeface="Courier New"/>
+                <a:cs typeface="Courier New"/>
+              </a:rPr>
+              <a:t>echo '</a:t>
+            </a:r>
+            <a:r>
+              <a:rPr lang="en-US" sz="2400" dirty="0" err="1" smtClean="0">
+                <a:latin typeface="Courier New"/>
+                <a:cs typeface="Courier New"/>
+              </a:rPr>
+              <a:t>ls</a:t>
+            </a:r>
+            <a:r>
+              <a:rPr lang="en-US" sz="2400" dirty="0" smtClean="0">
+                <a:latin typeface="Courier New"/>
+                <a:cs typeface="Courier New"/>
+              </a:rPr>
+              <a:t> –la *' &gt;&gt; </a:t>
+            </a:r>
+            <a:r>
+              <a:rPr lang="en-US" sz="2400" dirty="0" err="1" smtClean="0">
+                <a:latin typeface="Courier New"/>
+                <a:cs typeface="Courier New"/>
+              </a:rPr>
+              <a:t>myscript.sh</a:t>
+            </a:r>
+            <a:endParaRPr lang="en-US" sz="2400" dirty="0" smtClean="0">
+              <a:latin typeface="Courier New"/>
+              <a:cs typeface="Courier New"/>
+            </a:endParaRPr>
+          </a:p>
+          <a:p>
+            <a:pPr>
+              <a:buFont typeface="Lucida Grande"/>
+              <a:buChar char="$"/>
+            </a:pPr>
+            <a:r>
+              <a:rPr lang="en-US" sz="2400" dirty="0" err="1" smtClean="0">
+                <a:latin typeface="Courier New"/>
+                <a:cs typeface="Courier New"/>
+              </a:rPr>
+              <a:t>chmod</a:t>
+            </a:r>
+            <a:r>
+              <a:rPr lang="en-US" sz="2400" dirty="0" smtClean="0">
+                <a:latin typeface="Courier New"/>
+                <a:cs typeface="Courier New"/>
+              </a:rPr>
+              <a:t> </a:t>
+            </a:r>
+            <a:r>
+              <a:rPr lang="en-US" sz="2400" dirty="0" err="1" smtClean="0">
+                <a:latin typeface="Courier New"/>
+                <a:cs typeface="Courier New"/>
+              </a:rPr>
+              <a:t>u</a:t>
+            </a:r>
+            <a:r>
+              <a:rPr lang="en-US" sz="2400" dirty="0" smtClean="0">
+                <a:latin typeface="Courier New"/>
+                <a:cs typeface="Courier New"/>
+              </a:rPr>
+              <a:t>=+</a:t>
+            </a:r>
+            <a:r>
+              <a:rPr lang="en-US" sz="2400" dirty="0" err="1" smtClean="0">
+                <a:latin typeface="Courier New"/>
+                <a:cs typeface="Courier New"/>
+              </a:rPr>
+              <a:t>x</a:t>
+            </a:r>
+            <a:r>
+              <a:rPr lang="en-US" sz="2400" dirty="0" smtClean="0">
+                <a:latin typeface="Courier New"/>
+                <a:cs typeface="Courier New"/>
+              </a:rPr>
+              <a:t> </a:t>
+            </a:r>
+            <a:r>
+              <a:rPr lang="en-US" sz="2400" dirty="0" err="1" smtClean="0">
+                <a:latin typeface="Courier New"/>
+                <a:cs typeface="Courier New"/>
+              </a:rPr>
+              <a:t>myscript.sh</a:t>
+            </a:r>
+            <a:endParaRPr lang="en-US" sz="2400" dirty="0" smtClean="0">
+              <a:latin typeface="Courier New"/>
+              <a:cs typeface="Courier New"/>
+            </a:endParaRPr>
+          </a:p>
+          <a:p>
+            <a:pPr>
+              <a:buFont typeface="Lucida Grande"/>
+              <a:buChar char="$"/>
+            </a:pPr>
+            <a:r>
+              <a:rPr lang="en-US" sz="2400" dirty="0" smtClean="0">
+                <a:latin typeface="Courier New"/>
+                <a:cs typeface="Courier New"/>
+              </a:rPr>
+              <a:t>./</a:t>
+            </a:r>
+            <a:r>
+              <a:rPr lang="en-US" sz="2400" dirty="0" err="1" smtClean="0">
+                <a:latin typeface="Courier New"/>
+                <a:cs typeface="Courier New"/>
+              </a:rPr>
+              <a:t>myscript.sh</a:t>
+            </a:r>
+            <a:endParaRPr lang="en-US" sz="2400" dirty="0" smtClean="0">
+              <a:latin typeface="Courier New"/>
+              <a:cs typeface="Courier New"/>
+            </a:endParaRPr>
           </a:p>
         </p:txBody>
       </p:sp>
@@ -4429,6 +6605,13 @@
   <p:clrMapOvr>
     <a:masterClrMapping/>
   </p:clrMapOvr>
+  <p:timing>
+    <p:tnLst>
+      <p:par>
+        <p:cTn id="1" dur="indefinite" restart="never" nodeType="tmRoot"/>
+      </p:par>
+    </p:tnLst>
+  </p:timing>
 </p:sld>
 </file>
 
@@ -4466,7 +6649,7 @@
           <a:p>
             <a:r>
               <a:rPr lang="en-US" dirty="0" smtClean="0"/>
-              <a:t>Tests</a:t>
+              <a:t>Another example</a:t>
             </a:r>
             <a:endParaRPr lang="en-US" dirty="0"/>
           </a:p>
@@ -4487,7 +6670,50 @@
           <a:bodyPr/>
           <a:lstStyle/>
           <a:p>
-            <a:endParaRPr lang="en-US"/>
+            <a:r>
+              <a:rPr lang="en-US" dirty="0" smtClean="0"/>
+              <a:t>Once, when I was installing </a:t>
+            </a:r>
+            <a:r>
+              <a:rPr lang="en-US" dirty="0" err="1" smtClean="0"/>
+              <a:t>LWP::UserAgent</a:t>
+            </a:r>
+            <a:r>
+              <a:rPr lang="en-US" dirty="0" smtClean="0"/>
+              <a:t>, I accidentally the whole package, including HEAD (=fetches HTTP header)</a:t>
+            </a:r>
+          </a:p>
+          <a:p>
+            <a:r>
+              <a:rPr lang="en-US" dirty="0" smtClean="0"/>
+              <a:t>This overwrote the essential, system built-in </a:t>
+            </a:r>
+            <a:r>
+              <a:rPr lang="en-US" dirty="0" smtClean="0">
+                <a:latin typeface="Courier New"/>
+                <a:cs typeface="Courier New"/>
+              </a:rPr>
+              <a:t>head(1)</a:t>
+            </a:r>
+            <a:r>
+              <a:rPr lang="en-US" dirty="0" smtClean="0"/>
+              <a:t> utility on </a:t>
+            </a:r>
+            <a:r>
+              <a:rPr lang="en-US" dirty="0" err="1" smtClean="0"/>
+              <a:t>MacOSX</a:t>
+            </a:r>
+            <a:r>
+              <a:rPr lang="en-US" dirty="0" smtClean="0"/>
+              <a:t>.</a:t>
+            </a:r>
+          </a:p>
+          <a:p>
+            <a:r>
+              <a:rPr lang="en-US" dirty="0" smtClean="0"/>
+              <a:t>With some simple scripting I could re-create the functionality and recover from the damage.</a:t>
+            </a:r>
+            <a:endParaRPr lang="en-US" dirty="0"/>
           </a:p>
         </p:txBody>
       </p:sp>
@@ -4496,6 +6722,13 @@
   <p:clrMapOvr>
     <a:masterClrMapping/>
   </p:clrMapOvr>
+  <p:timing>
+    <p:tnLst>
+      <p:par>
+        <p:cTn id="1" dur="indefinite" restart="never" nodeType="tmRoot"/>
+      </p:par>
+    </p:tnLst>
+  </p:timing>
 </p:sld>
 </file>
 

</xml_diff>

<commit_message>
added link to advanced bash scripting guide
</commit_message>
<xml_diff>
--- a/doc/slides/day2/session1/CLIScripting.pptx
+++ b/doc/slides/day2/session1/CLIScripting.pptx
@@ -522,11 +522,7 @@
           <a:p>
             <a:r>
               <a:rPr lang="en-US" dirty="0" smtClean="0"/>
-              <a:t>Introducing bash scripting. Exercise: iterate over a set of files in a directory to perform an </a:t>
-            </a:r>
-            <a:r>
-              <a:rPr lang="en-US" dirty="0" smtClean="0"/>
-              <a:t>operation</a:t>
+              <a:t>Introducing bash scripting. Exercise: iterate over a set of files in a directory to perform an operation</a:t>
             </a:r>
             <a:endParaRPr lang="en-US" dirty="0"/>
           </a:p>
@@ -3762,6 +3758,13 @@
   <p:clrMapOvr>
     <a:masterClrMapping/>
   </p:clrMapOvr>
+  <p:timing>
+    <p:tnLst>
+      <p:par>
+        <p:cTn id="1" dur="indefinite" restart="never" nodeType="tmRoot"/>
+      </p:par>
+    </p:tnLst>
+  </p:timing>
 </p:sld>
 </file>
 
@@ -3890,6 +3893,13 @@
   <p:clrMapOvr>
     <a:masterClrMapping/>
   </p:clrMapOvr>
+  <p:timing>
+    <p:tnLst>
+      <p:par>
+        <p:cTn id="1" dur="indefinite" restart="never" nodeType="tmRoot"/>
+      </p:par>
+    </p:tnLst>
+  </p:timing>
 </p:sld>
 </file>
 
@@ -4196,6 +4206,13 @@
   <p:clrMapOvr>
     <a:masterClrMapping/>
   </p:clrMapOvr>
+  <p:timing>
+    <p:tnLst>
+      <p:par>
+        <p:cTn id="1" dur="indefinite" restart="never" nodeType="tmRoot"/>
+      </p:par>
+    </p:tnLst>
+  </p:timing>
 </p:sld>
 </file>
 
@@ -4327,6 +4344,13 @@
   <p:clrMapOvr>
     <a:masterClrMapping/>
   </p:clrMapOvr>
+  <p:timing>
+    <p:tnLst>
+      <p:par>
+        <p:cTn id="1" dur="indefinite" restart="never" nodeType="tmRoot"/>
+      </p:par>
+    </p:tnLst>
+  </p:timing>
 </p:sld>
 </file>
 
@@ -4495,6 +4519,13 @@
   <p:clrMapOvr>
     <a:masterClrMapping/>
   </p:clrMapOvr>
+  <p:timing>
+    <p:tnLst>
+      <p:par>
+        <p:cTn id="1" dur="indefinite" restart="never" nodeType="tmRoot"/>
+      </p:par>
+    </p:tnLst>
+  </p:timing>
 </p:sld>
 </file>
 
@@ -5373,6 +5404,13 @@
   <p:clrMapOvr>
     <a:masterClrMapping/>
   </p:clrMapOvr>
+  <p:timing>
+    <p:tnLst>
+      <p:par>
+        <p:cTn id="1" dur="indefinite" restart="never" nodeType="tmRoot"/>
+      </p:par>
+    </p:tnLst>
+  </p:timing>
 </p:sld>
 </file>
 
@@ -5428,105 +5466,106 @@
         </p:nvSpPr>
         <p:spPr/>
         <p:txBody>
-          <a:bodyPr/>
-          <a:lstStyle/>
-          <a:p>
-            <a:r>
-              <a:rPr lang="en-US" dirty="0" smtClean="0"/>
-              <a:t>Write a simple shell script </a:t>
-            </a:r>
-            <a:r>
-              <a:rPr lang="en-US" dirty="0" smtClean="0"/>
-              <a:t>that: </a:t>
+          <a:bodyPr>
+            <a:normAutofit/>
+          </a:bodyPr>
+          <a:lstStyle/>
+          <a:p>
+            <a:r>
+              <a:rPr lang="en-US" sz="2800" dirty="0" smtClean="0"/>
+              <a:t>Write a simple shell script that: </a:t>
             </a:r>
           </a:p>
           <a:p>
             <a:pPr lvl="1"/>
             <a:r>
-              <a:rPr lang="en-US" dirty="0" smtClean="0"/>
+              <a:rPr lang="en-US" sz="2400" dirty="0" smtClean="0"/>
               <a:t>uses "</a:t>
             </a:r>
             <a:r>
-              <a:rPr lang="en-US" dirty="0" err="1" smtClean="0"/>
+              <a:rPr lang="en-US" sz="2400" dirty="0" err="1" smtClean="0"/>
               <a:t>perl</a:t>
             </a:r>
             <a:r>
-              <a:rPr lang="en-US" dirty="0" smtClean="0"/>
+              <a:rPr lang="en-US" sz="2400" dirty="0" smtClean="0"/>
               <a:t> bin/</a:t>
             </a:r>
             <a:r>
-              <a:rPr lang="en-US" dirty="0" err="1" smtClean="0"/>
+              <a:rPr lang="en-US" sz="2400" dirty="0" err="1" smtClean="0"/>
               <a:t>fastqvalidate.pl</a:t>
             </a:r>
             <a:r>
-              <a:rPr lang="en-US" dirty="0" smtClean="0"/>
+              <a:rPr lang="en-US" sz="2400" dirty="0" smtClean="0"/>
               <a:t> $file"</a:t>
             </a:r>
           </a:p>
           <a:p>
             <a:pPr lvl="1"/>
             <a:r>
-              <a:rPr lang="en-US" dirty="0" smtClean="0"/>
-              <a:t>validates all </a:t>
-            </a:r>
-            <a:r>
-              <a:rPr lang="en-US" dirty="0" smtClean="0"/>
-              <a:t>FASTQ files in the data/</a:t>
-            </a:r>
-            <a:r>
-              <a:rPr lang="en-US" dirty="0" err="1" smtClean="0"/>
+              <a:rPr lang="en-US" sz="2400" dirty="0" smtClean="0"/>
+              <a:t>validates all FASTQ files in the data/</a:t>
+            </a:r>
+            <a:r>
+              <a:rPr lang="en-US" sz="2400" dirty="0" err="1" smtClean="0"/>
               <a:t>fastq</a:t>
             </a:r>
             <a:r>
-              <a:rPr lang="en-US" dirty="0" smtClean="0"/>
-              <a:t> </a:t>
-            </a:r>
-            <a:r>
-              <a:rPr lang="en-US" dirty="0" smtClean="0"/>
-              <a:t>folder</a:t>
+              <a:rPr lang="en-US" sz="2400" dirty="0" smtClean="0"/>
+              <a:t> folder</a:t>
             </a:r>
           </a:p>
           <a:p>
             <a:pPr lvl="1"/>
             <a:r>
-              <a:rPr lang="en-US" dirty="0" smtClean="0"/>
-              <a:t>prints </a:t>
-            </a:r>
-            <a:r>
-              <a:rPr lang="en-US" dirty="0" smtClean="0"/>
-              <a:t>out the names of invalid </a:t>
-            </a:r>
-            <a:r>
-              <a:rPr lang="en-US" dirty="0" smtClean="0"/>
-              <a:t>files</a:t>
-            </a:r>
-          </a:p>
-          <a:p>
-            <a:r>
-              <a:rPr lang="en-US" dirty="0" smtClean="0"/>
+              <a:rPr lang="en-US" sz="2400" dirty="0" smtClean="0"/>
+              <a:t>prints out the names of invalid files</a:t>
+            </a:r>
+          </a:p>
+          <a:p>
+            <a:r>
+              <a:rPr lang="en-US" sz="2800" dirty="0" smtClean="0"/>
               <a:t>If </a:t>
             </a:r>
             <a:r>
-              <a:rPr lang="en-US" dirty="0" err="1" smtClean="0"/>
+              <a:rPr lang="en-US" sz="2800" dirty="0" err="1" smtClean="0"/>
               <a:t>fastqvalidate.pl</a:t>
             </a:r>
             <a:r>
-              <a:rPr lang="en-US" dirty="0" smtClean="0"/>
-              <a:t> dies (i.e. invalid file) the exit code $? should be non-zero. </a:t>
-            </a:r>
-            <a:r>
-              <a:rPr lang="en-US" smtClean="0"/>
-              <a:t>Use this.</a:t>
-            </a:r>
-          </a:p>
-          <a:p>
-            <a:r>
-              <a:rPr lang="en-US" dirty="0" smtClean="0"/>
-              <a:t>From the file names you can see which should not validate: error_*</a:t>
-            </a:r>
-          </a:p>
-          <a:p>
-            <a:endParaRPr lang="en-US" dirty="0"/>
+              <a:rPr lang="en-US" sz="2800" dirty="0" smtClean="0"/>
+              <a:t> dies (i.e. invalid file) the exit code $? should be non-zero. Use this.</a:t>
+            </a:r>
+          </a:p>
+          <a:p>
+            <a:r>
+              <a:rPr lang="en-US" sz="2800" dirty="0" smtClean="0"/>
+              <a:t>From the file names you can see which should not validate: error_</a:t>
+            </a:r>
+            <a:r>
+              <a:rPr lang="en-US" sz="2800" dirty="0" smtClean="0"/>
+              <a:t>*</a:t>
+            </a:r>
+          </a:p>
+          <a:p>
+            <a:r>
+              <a:rPr lang="en-US" sz="2800" dirty="0" smtClean="0"/>
+              <a:t>Bash manual: </a:t>
+            </a:r>
+            <a:r>
+              <a:rPr lang="en-US" sz="2800" dirty="0" smtClean="0"/>
+              <a:t>http://</a:t>
+            </a:r>
+            <a:r>
+              <a:rPr lang="en-US" sz="2800" dirty="0" err="1" smtClean="0"/>
+              <a:t>www.tldp.org</a:t>
+            </a:r>
+            <a:r>
+              <a:rPr lang="en-US" sz="2800" dirty="0" smtClean="0"/>
+              <a:t>/LDP/abs/html/</a:t>
+            </a:r>
+            <a:endParaRPr lang="en-US" sz="2800" dirty="0" smtClean="0"/>
+          </a:p>
+          <a:p>
+            <a:endParaRPr lang="en-US" sz="2800" dirty="0"/>
           </a:p>
         </p:txBody>
       </p:sp>
@@ -5535,6 +5574,13 @@
   <p:clrMapOvr>
     <a:masterClrMapping/>
   </p:clrMapOvr>
+  <p:timing>
+    <p:tnLst>
+      <p:par>
+        <p:cTn id="1" dur="indefinite" restart="never" nodeType="tmRoot"/>
+      </p:par>
+    </p:tnLst>
+  </p:timing>
 </p:sld>
 </file>
 

</xml_diff>